<commit_message>
Updated slides for L03 L04
</commit_message>
<xml_diff>
--- a/Slides-RPR/2019-H1-DAA-L02-ProgOverview.pptx
+++ b/Slides-RPR/2019-H1-DAA-L02-ProgOverview.pptx
@@ -16,6 +16,7 @@
     <p:sldId id="261" r:id="rId13"/>
     <p:sldId id="262" r:id="rId14"/>
     <p:sldId id="263" r:id="rId15"/>
+    <p:sldId id="264" r:id="rId16"/>
   </p:sldIdLst>
   <p:sldSz cx="10160000" cy="7620000"/>
   <p:notesSz cx="6858000" cy="9144000"/>
@@ -2347,7 +2348,11 @@
           <a:bodyPr/>
           <a:lstStyle>
             <a:lvl1pPr>
-              <a:defRPr u="sng">
+              <a:defRPr sz="3000" u="sng">
+                <a:latin typeface="Arial"/>
+                <a:ea typeface="Arial"/>
+                <a:cs typeface="Arial"/>
+                <a:sym typeface="Arial"/>
                 <a:hlinkClick r:id="rId2" invalidUrl="" action="" tgtFrame="" tooltip="" history="1" highlightClick="0" endSnd="0"/>
               </a:defRPr>
             </a:lvl1pPr>
@@ -2590,7 +2595,7 @@
               </a:spcBef>
             </a:pPr>
             <a:r>
-              <a:t>Don’t ignore the warnings (cab be more harmful)</a:t>
+              <a:t>Don’t ignore the warnings (can be more harmful)</a:t>
             </a:r>
           </a:p>
           <a:p>
@@ -3505,7 +3510,7 @@
       </p:grpSpPr>
       <p:sp>
         <p:nvSpPr>
-          <p:cNvPr id="50" name="Exercise 1"/>
+          <p:cNvPr id="50" name="HelloWorld.java"/>
           <p:cNvSpPr txBox="1"/>
           <p:nvPr>
             <p:ph type="title"/>
@@ -3522,14 +3527,14 @@
           <a:p>
             <a:pPr/>
             <a:r>
-              <a:t>Exercise 1</a:t>
+              <a:t>HelloWorld.java</a:t>
             </a:r>
           </a:p>
         </p:txBody>
       </p:sp>
       <p:sp>
         <p:nvSpPr>
-          <p:cNvPr id="51" name="Write a program initials.java to print your initials using 9 rows with corresponding initial letter, e.g.…"/>
+          <p:cNvPr id="51" name="public class HelloWorld {…"/>
           <p:cNvSpPr txBox="1"/>
           <p:nvPr>
             <p:ph type="body" idx="1"/>
@@ -3537,8 +3542,8 @@
         </p:nvSpPr>
         <p:spPr>
           <a:xfrm>
-            <a:off x="887784" y="938113"/>
-            <a:ext cx="9049198" cy="5891610"/>
+            <a:off x="581198" y="1042550"/>
+            <a:ext cx="8997604" cy="5891610"/>
           </a:xfrm>
           <a:prstGeom prst="rect">
             <a:avLst/>
@@ -3548,28 +3553,25 @@
           <a:bodyPr/>
           <a:lstStyle/>
           <a:p>
-            <a:pPr/>
-            <a:r>
-              <a:t>Write a program initials.java to print your initials using 9 rows with corresponding initial letter, e.g.</a:t>
-            </a:r>
-          </a:p>
-          <a:p>
             <a:pPr marL="0" indent="0">
               <a:buSzTx/>
               <a:buNone/>
-              <a:defRPr sz="3000">
+              <a:defRPr sz="2700">
                 <a:latin typeface="Courier New"/>
                 <a:ea typeface="Courier New"/>
                 <a:cs typeface="Courier New"/>
                 <a:sym typeface="Courier New"/>
               </a:defRPr>
             </a:pPr>
+            <a:r>
+              <a:t>public class HelloWorld {</a:t>
+            </a:r>
           </a:p>
           <a:p>
             <a:pPr marL="0" indent="0">
               <a:buSzTx/>
               <a:buNone/>
-              <a:defRPr b="1" sz="3000">
+              <a:defRPr sz="2700">
                 <a:latin typeface="Courier New"/>
                 <a:ea typeface="Courier New"/>
                 <a:cs typeface="Courier New"/>
@@ -3577,14 +3579,17 @@
               </a:defRPr>
             </a:pPr>
             <a:r>
-              <a:t>RRRRR        PPPPP        RRRRR </a:t>
-            </a:r>
-          </a:p>
-          <a:p>
-            <a:pPr marL="0" indent="0">
+              <a:t>   public static void main(String[] args){</a:t>
+            </a:r>
+          </a:p>
+          <a:p>
+            <a:pPr lvl="1" marL="0" indent="228600">
+              <a:spcBef>
+                <a:spcPts val="700"/>
+              </a:spcBef>
               <a:buSzTx/>
               <a:buNone/>
-              <a:defRPr b="1" sz="3000">
+              <a:defRPr sz="2700">
                 <a:latin typeface="Courier New"/>
                 <a:ea typeface="Courier New"/>
                 <a:cs typeface="Courier New"/>
@@ -3592,14 +3597,17 @@
               </a:defRPr>
             </a:pPr>
             <a:r>
-              <a:t>RR   RR      PP   PP      RR   RR </a:t>
-            </a:r>
-          </a:p>
-          <a:p>
-            <a:pPr marL="0" indent="0">
+              <a:t>  // Displays "Hello, World”.</a:t>
+            </a:r>
+          </a:p>
+          <a:p>
+            <a:pPr lvl="3" marL="0" indent="685800">
+              <a:spcBef>
+                <a:spcPts val="700"/>
+              </a:spcBef>
               <a:buSzTx/>
               <a:buNone/>
-              <a:defRPr b="1" sz="3000">
+              <a:defRPr sz="2700">
                 <a:latin typeface="Courier New"/>
                 <a:ea typeface="Courier New"/>
                 <a:cs typeface="Courier New"/>
@@ -3607,14 +3615,14 @@
               </a:defRPr>
             </a:pPr>
             <a:r>
-              <a:t>RR    RRR    PP    PPP    RR    RRR </a:t>
+              <a:t>// First intro java program</a:t>
             </a:r>
           </a:p>
           <a:p>
             <a:pPr marL="0" indent="0">
               <a:buSzTx/>
               <a:buNone/>
-              <a:defRPr b="1" sz="3000">
+              <a:defRPr sz="2700">
                 <a:latin typeface="Courier New"/>
                 <a:ea typeface="Courier New"/>
                 <a:cs typeface="Courier New"/>
@@ -3622,14 +3630,14 @@
               </a:defRPr>
             </a:pPr>
             <a:r>
-              <a:t>RR    RRR    PP    PPP    RR   RRR </a:t>
+              <a:t>      System.out.println("Hello, World!");</a:t>
             </a:r>
           </a:p>
           <a:p>
             <a:pPr marL="0" indent="0">
               <a:buSzTx/>
               <a:buNone/>
-              <a:defRPr b="1" sz="3000">
+              <a:defRPr sz="2700">
                 <a:latin typeface="Courier New"/>
                 <a:ea typeface="Courier New"/>
                 <a:cs typeface="Courier New"/>
@@ -3637,14 +3645,14 @@
               </a:defRPr>
             </a:pPr>
             <a:r>
-              <a:t>RR   RR      PP   PP      RR   RR </a:t>
+              <a:t>   }</a:t>
             </a:r>
           </a:p>
           <a:p>
             <a:pPr marL="0" indent="0">
               <a:buSzTx/>
               <a:buNone/>
-              <a:defRPr b="1" sz="3000">
+              <a:defRPr sz="2700">
                 <a:latin typeface="Courier New"/>
                 <a:ea typeface="Courier New"/>
                 <a:cs typeface="Courier New"/>
@@ -3652,52 +3660,7 @@
               </a:defRPr>
             </a:pPr>
             <a:r>
-              <a:t>RRRRR        PPPPP        RRRRR  </a:t>
-            </a:r>
-          </a:p>
-          <a:p>
-            <a:pPr marL="0" indent="0">
-              <a:buSzTx/>
-              <a:buNone/>
-              <a:defRPr b="1" sz="3000">
-                <a:latin typeface="Courier New"/>
-                <a:ea typeface="Courier New"/>
-                <a:cs typeface="Courier New"/>
-                <a:sym typeface="Courier New"/>
-              </a:defRPr>
-            </a:pPr>
-            <a:r>
-              <a:t>RR   RR      PP           RR   RR </a:t>
-            </a:r>
-          </a:p>
-          <a:p>
-            <a:pPr marL="0" indent="0">
-              <a:buSzTx/>
-              <a:buNone/>
-              <a:defRPr b="1" sz="3000">
-                <a:latin typeface="Courier New"/>
-                <a:ea typeface="Courier New"/>
-                <a:cs typeface="Courier New"/>
-                <a:sym typeface="Courier New"/>
-              </a:defRPr>
-            </a:pPr>
-            <a:r>
-              <a:t>RR     RR    PP           RR     RR </a:t>
-            </a:r>
-          </a:p>
-          <a:p>
-            <a:pPr marL="0" indent="0">
-              <a:buSzTx/>
-              <a:buNone/>
-              <a:defRPr b="1" sz="3000">
-                <a:latin typeface="Courier New"/>
-                <a:ea typeface="Courier New"/>
-                <a:cs typeface="Courier New"/>
-                <a:sym typeface="Courier New"/>
-              </a:defRPr>
-            </a:pPr>
-            <a:r>
-              <a:t>RR       RR  PP           RR       RR</a:t>
+              <a:t>}</a:t>
             </a:r>
           </a:p>
         </p:txBody>
@@ -3848,458 +3811,7 @@
                                       <p:cBhvr>
                                         <p:cTn id="6" fill="hold"/>
                                         <p:tgtEl>
-                                          <p:spTgt spid="51"/>
-                                        </p:tgtEl>
-                                        <p:attrNameLst>
-                                          <p:attrName>style.visibility</p:attrName>
-                                        </p:attrNameLst>
-                                      </p:cBhvr>
-                                      <p:to>
-                                        <p:strVal val="visible"/>
-                                      </p:to>
-                                    </p:set>
-                                  </p:childTnLst>
-                                </p:cTn>
-                              </p:par>
-                            </p:childTnLst>
-                          </p:cTn>
-                        </p:par>
-                      </p:childTnLst>
-                    </p:cTn>
-                  </p:par>
-                </p:childTnLst>
-              </p:cTn>
-              <p:prevCondLst>
-                <p:cond evt="onPrev">
-                  <p:tgtEl>
-                    <p:sldTgt/>
-                  </p:tgtEl>
-                </p:cond>
-              </p:prevCondLst>
-              <p:nextCondLst>
-                <p:cond evt="onNext">
-                  <p:tgtEl>
-                    <p:sldTgt/>
-                  </p:tgtEl>
-                </p:cond>
-              </p:nextCondLst>
-            </p:seq>
-          </p:childTnLst>
-        </p:cTn>
-      </p:par>
-    </p:tnLst>
-    <p:bldLst>
-      <p:bldP build="whole" bldLvl="1" animBg="1" rev="0" advAuto="0" spid="51" grpId="1"/>
-    </p:bldLst>
-  </p:timing>
-</p:sld>
-</file>
-
-<file path=ppt/slides/slide5.xml><?xml version="1.0" encoding="utf-8"?>
-<p:sld xmlns:a="http://schemas.openxmlformats.org/drawingml/2006/main" xmlns:r="http://schemas.openxmlformats.org/officeDocument/2006/relationships" xmlns:p="http://schemas.openxmlformats.org/presentationml/2006/main" xmlns:m="http://schemas.openxmlformats.org/officeDocument/2006/math" xmlns:a14="http://schemas.microsoft.com/office/drawing/2010/main" showMasterSp="1" showMasterPhAnim="1">
-  <p:cSld>
-    <p:spTree>
-      <p:nvGrpSpPr>
-        <p:cNvPr id="1" name=""/>
-        <p:cNvGrpSpPr/>
-        <p:nvPr/>
-      </p:nvGrpSpPr>
-      <p:grpSpPr>
-        <a:xfrm>
-          <a:off x="0" y="0"/>
-          <a:ext cx="0" cy="0"/>
-          <a:chOff x="0" y="0"/>
-          <a:chExt cx="0" cy="0"/>
-        </a:xfrm>
-      </p:grpSpPr>
-      <p:sp>
-        <p:nvSpPr>
-          <p:cNvPr id="56" name="Initials.java (RPR)"/>
-          <p:cNvSpPr txBox="1"/>
-          <p:nvPr>
-            <p:ph type="title"/>
-          </p:nvPr>
-        </p:nvSpPr>
-        <p:spPr>
-          <a:prstGeom prst="rect">
-            <a:avLst/>
-          </a:prstGeom>
-        </p:spPr>
-        <p:txBody>
-          <a:bodyPr/>
-          <a:lstStyle/>
-          <a:p>
-            <a:pPr/>
-            <a:r>
-              <a:t>Initials.java (RPR)</a:t>
-            </a:r>
-          </a:p>
-        </p:txBody>
-      </p:sp>
-      <p:sp>
-        <p:nvSpPr>
-          <p:cNvPr id="57" name="public class Initials {…"/>
-          <p:cNvSpPr txBox="1"/>
-          <p:nvPr>
-            <p:ph type="body" idx="1"/>
-          </p:nvPr>
-        </p:nvSpPr>
-        <p:spPr>
-          <a:xfrm>
-            <a:off x="182140" y="938113"/>
-            <a:ext cx="9795720" cy="5891610"/>
-          </a:xfrm>
-          <a:prstGeom prst="rect">
-            <a:avLst/>
-          </a:prstGeom>
-        </p:spPr>
-        <p:txBody>
-          <a:bodyPr/>
-          <a:lstStyle/>
-          <a:p>
-            <a:pPr marL="0" indent="0">
-              <a:buSzTx/>
-              <a:buNone/>
-              <a:defRPr sz="1900">
-                <a:latin typeface="Courier New"/>
-                <a:ea typeface="Courier New"/>
-                <a:cs typeface="Courier New"/>
-                <a:sym typeface="Courier New"/>
-              </a:defRPr>
-            </a:pPr>
-            <a:r>
-              <a:t>public class Initials {</a:t>
-            </a:r>
-          </a:p>
-          <a:p>
-            <a:pPr marL="0" indent="0">
-              <a:buSzTx/>
-              <a:buNone/>
-              <a:defRPr sz="1900">
-                <a:latin typeface="Courier New"/>
-                <a:ea typeface="Courier New"/>
-                <a:cs typeface="Courier New"/>
-                <a:sym typeface="Courier New"/>
-              </a:defRPr>
-            </a:pPr>
-            <a:r>
-              <a:t>  public static void main(String[] args) {</a:t>
-            </a:r>
-          </a:p>
-          <a:p>
-            <a:pPr marL="0" indent="0">
-              <a:buSzTx/>
-              <a:buNone/>
-              <a:defRPr sz="1900">
-                <a:latin typeface="Courier New"/>
-                <a:ea typeface="Courier New"/>
-                <a:cs typeface="Courier New"/>
-                <a:sym typeface="Courier New"/>
-              </a:defRPr>
-            </a:pPr>
-            <a:r>
-              <a:t>    System.out.println("RRRRR        PPPPP        RRRRR ");</a:t>
-            </a:r>
-          </a:p>
-          <a:p>
-            <a:pPr marL="0" indent="0">
-              <a:buSzTx/>
-              <a:buNone/>
-              <a:defRPr sz="1900">
-                <a:latin typeface="Courier New"/>
-                <a:ea typeface="Courier New"/>
-                <a:cs typeface="Courier New"/>
-                <a:sym typeface="Courier New"/>
-              </a:defRPr>
-            </a:pPr>
-            <a:r>
-              <a:t>    System.out.println("RR   RR      PP   PP      RR   RR");</a:t>
-            </a:r>
-          </a:p>
-          <a:p>
-            <a:pPr marL="0" indent="0">
-              <a:buSzTx/>
-              <a:buNone/>
-              <a:defRPr sz="1900">
-                <a:latin typeface="Courier New"/>
-                <a:ea typeface="Courier New"/>
-                <a:cs typeface="Courier New"/>
-                <a:sym typeface="Courier New"/>
-              </a:defRPr>
-            </a:pPr>
-            <a:r>
-              <a:t>    System.out.println("RR    RRR    PP    PPP    RR    RRR ");</a:t>
-            </a:r>
-          </a:p>
-          <a:p>
-            <a:pPr marL="0" indent="0">
-              <a:buSzTx/>
-              <a:buNone/>
-              <a:defRPr sz="1900">
-                <a:latin typeface="Courier New"/>
-                <a:ea typeface="Courier New"/>
-                <a:cs typeface="Courier New"/>
-                <a:sym typeface="Courier New"/>
-              </a:defRPr>
-            </a:pPr>
-            <a:r>
-              <a:t>    System.out.println("RR    RRR    PP    PPP    RR   RRR ");</a:t>
-            </a:r>
-          </a:p>
-          <a:p>
-            <a:pPr marL="0" indent="0">
-              <a:buSzTx/>
-              <a:buNone/>
-              <a:defRPr sz="1900">
-                <a:latin typeface="Courier New"/>
-                <a:ea typeface="Courier New"/>
-                <a:cs typeface="Courier New"/>
-                <a:sym typeface="Courier New"/>
-              </a:defRPr>
-            </a:pPr>
-            <a:r>
-              <a:t>    System.out.println("RR   RR      PP   PP      RR   RR ");</a:t>
-            </a:r>
-          </a:p>
-          <a:p>
-            <a:pPr marL="0" indent="0">
-              <a:buSzTx/>
-              <a:buNone/>
-              <a:defRPr sz="1900">
-                <a:latin typeface="Courier New"/>
-                <a:ea typeface="Courier New"/>
-                <a:cs typeface="Courier New"/>
-                <a:sym typeface="Courier New"/>
-              </a:defRPr>
-            </a:pPr>
-            <a:r>
-              <a:t>    System.out.println("RRRRR        PPPPP        RRRRR  ");</a:t>
-            </a:r>
-          </a:p>
-          <a:p>
-            <a:pPr marL="0" indent="0">
-              <a:buSzTx/>
-              <a:buNone/>
-              <a:defRPr sz="1900">
-                <a:latin typeface="Courier New"/>
-                <a:ea typeface="Courier New"/>
-                <a:cs typeface="Courier New"/>
-                <a:sym typeface="Courier New"/>
-              </a:defRPr>
-            </a:pPr>
-            <a:r>
-              <a:t>    System.out.println("RR   RR      PP           RR   RR");</a:t>
-            </a:r>
-          </a:p>
-          <a:p>
-            <a:pPr marL="0" indent="0">
-              <a:buSzTx/>
-              <a:buNone/>
-              <a:defRPr sz="1900">
-                <a:latin typeface="Courier New"/>
-                <a:ea typeface="Courier New"/>
-                <a:cs typeface="Courier New"/>
-                <a:sym typeface="Courier New"/>
-              </a:defRPr>
-            </a:pPr>
-            <a:r>
-              <a:t>    System.out.println("RR     RR    PP           RR     RR");</a:t>
-            </a:r>
-          </a:p>
-          <a:p>
-            <a:pPr marL="0" indent="0">
-              <a:buSzTx/>
-              <a:buNone/>
-              <a:defRPr sz="1900">
-                <a:latin typeface="Courier New"/>
-                <a:ea typeface="Courier New"/>
-                <a:cs typeface="Courier New"/>
-                <a:sym typeface="Courier New"/>
-              </a:defRPr>
-            </a:pPr>
-            <a:r>
-              <a:t>    System.out.println("RR       RR  PP           RR       RR");</a:t>
-            </a:r>
-          </a:p>
-          <a:p>
-            <a:pPr marL="0" indent="0">
-              <a:buSzTx/>
-              <a:buNone/>
-              <a:defRPr sz="1900">
-                <a:latin typeface="Courier New"/>
-                <a:ea typeface="Courier New"/>
-                <a:cs typeface="Courier New"/>
-                <a:sym typeface="Courier New"/>
-              </a:defRPr>
-            </a:pPr>
-            <a:r>
-              <a:t>  }</a:t>
-            </a:r>
-          </a:p>
-          <a:p>
-            <a:pPr marL="0" indent="0">
-              <a:buSzTx/>
-              <a:buNone/>
-              <a:defRPr sz="1900">
-                <a:latin typeface="Courier New"/>
-                <a:ea typeface="Courier New"/>
-                <a:cs typeface="Courier New"/>
-                <a:sym typeface="Courier New"/>
-              </a:defRPr>
-            </a:pPr>
-            <a:r>
-              <a:t>}</a:t>
-            </a:r>
-          </a:p>
-        </p:txBody>
-      </p:sp>
-      <p:sp>
-        <p:nvSpPr>
-          <p:cNvPr id="58" name="Slide Number"/>
-          <p:cNvSpPr txBox="1"/>
-          <p:nvPr>
-            <p:ph type="sldNum" sz="quarter" idx="2"/>
-          </p:nvPr>
-        </p:nvSpPr>
-        <p:spPr>
-          <a:prstGeom prst="rect">
-            <a:avLst/>
-          </a:prstGeom>
-          <a:extLst>
-            <a:ext uri="{C572A759-6A51-4108-AA02-DFA0A04FC94B}">
-              <ma14:wrappingTextBoxFlag xmlns:ma14="http://schemas.microsoft.com/office/mac/drawingml/2011/main" val="1"/>
-            </a:ext>
-          </a:extLst>
-        </p:spPr>
-        <p:txBody>
-          <a:bodyPr/>
-          <a:lstStyle/>
-          <a:p>
-            <a:pPr/>
-            <a:fld id="{86CB4B4D-7CA3-9044-876B-883B54F8677D}" type="slidenum"/>
-          </a:p>
-        </p:txBody>
-      </p:sp>
-      <p:sp>
-        <p:nvSpPr>
-          <p:cNvPr id="59" name="DAA/Programming Overview"/>
-          <p:cNvSpPr txBox="1"/>
-          <p:nvPr/>
-        </p:nvSpPr>
-        <p:spPr>
-          <a:xfrm>
-            <a:off x="423212" y="6963885"/>
-            <a:ext cx="3854213" cy="431552"/>
-          </a:xfrm>
-          <a:prstGeom prst="rect">
-            <a:avLst/>
-          </a:prstGeom>
-          <a:ln w="12700">
-            <a:miter lim="400000"/>
-          </a:ln>
-          <a:extLst>
-            <a:ext uri="{C572A759-6A51-4108-AA02-DFA0A04FC94B}">
-              <ma14:wrappingTextBoxFlag xmlns:ma14="http://schemas.microsoft.com/office/mac/drawingml/2011/main" val="1"/>
-            </a:ext>
-          </a:extLst>
-        </p:spPr>
-        <p:txBody>
-          <a:bodyPr wrap="none" lIns="50800" tIns="50800" rIns="50800" bIns="50800" anchor="ctr">
-            <a:spAutoFit/>
-          </a:bodyPr>
-          <a:lstStyle>
-            <a:lvl1pPr>
-              <a:defRPr sz="2400"/>
-            </a:lvl1pPr>
-          </a:lstStyle>
-          <a:p>
-            <a:pPr/>
-            <a:r>
-              <a:t>DAA/Programming Overview</a:t>
-            </a:r>
-          </a:p>
-        </p:txBody>
-      </p:sp>
-      <p:sp>
-        <p:nvSpPr>
-          <p:cNvPr id="60" name="RPR/"/>
-          <p:cNvSpPr txBox="1"/>
-          <p:nvPr/>
-        </p:nvSpPr>
-        <p:spPr>
-          <a:xfrm>
-            <a:off x="7535212" y="6988206"/>
-            <a:ext cx="705605" cy="382910"/>
-          </a:xfrm>
-          <a:prstGeom prst="rect">
-            <a:avLst/>
-          </a:prstGeom>
-          <a:ln w="12700">
-            <a:miter lim="400000"/>
-          </a:ln>
-          <a:extLst>
-            <a:ext uri="{C572A759-6A51-4108-AA02-DFA0A04FC94B}">
-              <ma14:wrappingTextBoxFlag xmlns:ma14="http://schemas.microsoft.com/office/mac/drawingml/2011/main" val="1"/>
-            </a:ext>
-          </a:extLst>
-        </p:spPr>
-        <p:txBody>
-          <a:bodyPr wrap="none" lIns="50800" tIns="50800" rIns="50800" bIns="50800" anchor="ctr">
-            <a:spAutoFit/>
-          </a:bodyPr>
-          <a:lstStyle>
-            <a:lvl1pPr>
-              <a:defRPr sz="2000"/>
-            </a:lvl1pPr>
-          </a:lstStyle>
-          <a:p>
-            <a:pPr/>
-            <a:r>
-              <a:t>RPR/</a:t>
-            </a:r>
-          </a:p>
-        </p:txBody>
-      </p:sp>
-    </p:spTree>
-  </p:cSld>
-  <p:clrMapOvr>
-    <a:masterClrMapping/>
-  </p:clrMapOvr>
-  <p:transition xmlns:p14="http://schemas.microsoft.com/office/powerpoint/2010/main" spd="med" advClick="1"/>
-  <p:timing>
-    <p:tnLst>
-      <p:par>
-        <p:cTn id="1" nodeType="tmRoot" restart="never" dur="indefinite" fill="hold">
-          <p:childTnLst>
-            <p:seq concurrent="1" prevAc="none" nextAc="seek">
-              <p:cTn id="2" nodeType="mainSeq" dur="indefinite" fill="hold">
-                <p:childTnLst>
-                  <p:par>
-                    <p:cTn id="3" fill="hold">
-                      <p:stCondLst>
-                        <p:cond delay="indefinite"/>
-                      </p:stCondLst>
-                      <p:childTnLst>
-                        <p:par>
-                          <p:cTn id="4" fill="hold">
-                            <p:stCondLst>
-                              <p:cond delay="0"/>
-                            </p:stCondLst>
-                            <p:childTnLst>
-                              <p:par>
-                                <p:cTn id="5" presetClass="entr" nodeType="clickEffect" presetSubtype="0" presetID="1" grpId="1" fill="hold">
-                                  <p:stCondLst>
-                                    <p:cond delay="0"/>
-                                  </p:stCondLst>
-                                  <p:iterate type="el" backwards="0">
-                                    <p:tmAbs val="0"/>
-                                  </p:iterate>
-                                  <p:childTnLst>
-                                    <p:set>
-                                      <p:cBhvr>
-                                        <p:cTn id="6" fill="hold"/>
-                                        <p:tgtEl>
-                                          <p:spTgt spid="57">
+                                          <p:spTgt spid="51">
                                             <p:bg/>
                                           </p:spTgt>
                                         </p:tgtEl>
@@ -4327,7 +3839,7 @@
                                       <p:cBhvr>
                                         <p:cTn id="8" fill="hold"/>
                                         <p:tgtEl>
-                                          <p:spTgt spid="57">
+                                          <p:spTgt spid="51">
                                             <p:txEl>
                                               <p:pRg st="0" end="0"/>
                                             </p:txEl>
@@ -4375,7 +3887,7 @@
                                       <p:cBhvr>
                                         <p:cTn id="12" fill="hold"/>
                                         <p:tgtEl>
-                                          <p:spTgt spid="57">
+                                          <p:spTgt spid="51">
                                             <p:txEl>
                                               <p:pRg st="1" end="1"/>
                                             </p:txEl>
@@ -4423,7 +3935,7 @@
                                       <p:cBhvr>
                                         <p:cTn id="16" fill="hold"/>
                                         <p:tgtEl>
-                                          <p:spTgt spid="57">
+                                          <p:spTgt spid="51">
                                             <p:txEl>
                                               <p:pRg st="2" end="2"/>
                                             </p:txEl>
@@ -4471,7 +3983,7 @@
                                       <p:cBhvr>
                                         <p:cTn id="20" fill="hold"/>
                                         <p:tgtEl>
-                                          <p:spTgt spid="57">
+                                          <p:spTgt spid="51">
                                             <p:txEl>
                                               <p:pRg st="3" end="3"/>
                                             </p:txEl>
@@ -4519,7 +4031,7 @@
                                       <p:cBhvr>
                                         <p:cTn id="24" fill="hold"/>
                                         <p:tgtEl>
-                                          <p:spTgt spid="57">
+                                          <p:spTgt spid="51">
                                             <p:txEl>
                                               <p:pRg st="4" end="4"/>
                                             </p:txEl>
@@ -4567,7 +4079,7 @@
                                       <p:cBhvr>
                                         <p:cTn id="28" fill="hold"/>
                                         <p:tgtEl>
-                                          <p:spTgt spid="57">
+                                          <p:spTgt spid="51">
                                             <p:txEl>
                                               <p:pRg st="5" end="5"/>
                                             </p:txEl>
@@ -4615,7 +4127,7 @@
                                       <p:cBhvr>
                                         <p:cTn id="32" fill="hold"/>
                                         <p:tgtEl>
-                                          <p:spTgt spid="57">
+                                          <p:spTgt spid="51">
                                             <p:txEl>
                                               <p:pRg st="6" end="6"/>
                                             </p:txEl>
@@ -4663,249 +4175,9 @@
                                       <p:cBhvr>
                                         <p:cTn id="36" fill="hold"/>
                                         <p:tgtEl>
-                                          <p:spTgt spid="57">
+                                          <p:spTgt spid="51">
                                             <p:txEl>
                                               <p:pRg st="7" end="7"/>
-                                            </p:txEl>
-                                          </p:spTgt>
-                                        </p:tgtEl>
-                                        <p:attrNameLst>
-                                          <p:attrName>style.visibility</p:attrName>
-                                        </p:attrNameLst>
-                                      </p:cBhvr>
-                                      <p:to>
-                                        <p:strVal val="visible"/>
-                                      </p:to>
-                                    </p:set>
-                                  </p:childTnLst>
-                                </p:cTn>
-                              </p:par>
-                            </p:childTnLst>
-                          </p:cTn>
-                        </p:par>
-                      </p:childTnLst>
-                    </p:cTn>
-                  </p:par>
-                  <p:par>
-                    <p:cTn id="37" fill="hold">
-                      <p:stCondLst>
-                        <p:cond delay="indefinite"/>
-                      </p:stCondLst>
-                      <p:childTnLst>
-                        <p:par>
-                          <p:cTn id="38" fill="hold">
-                            <p:stCondLst>
-                              <p:cond delay="0"/>
-                            </p:stCondLst>
-                            <p:childTnLst>
-                              <p:par>
-                                <p:cTn id="39" presetClass="entr" nodeType="clickEffect" presetSubtype="0" presetID="1" grpId="1" fill="hold">
-                                  <p:stCondLst>
-                                    <p:cond delay="0"/>
-                                  </p:stCondLst>
-                                  <p:iterate type="el" backwards="0">
-                                    <p:tmAbs val="0"/>
-                                  </p:iterate>
-                                  <p:childTnLst>
-                                    <p:set>
-                                      <p:cBhvr>
-                                        <p:cTn id="40" fill="hold"/>
-                                        <p:tgtEl>
-                                          <p:spTgt spid="57">
-                                            <p:txEl>
-                                              <p:pRg st="8" end="8"/>
-                                            </p:txEl>
-                                          </p:spTgt>
-                                        </p:tgtEl>
-                                        <p:attrNameLst>
-                                          <p:attrName>style.visibility</p:attrName>
-                                        </p:attrNameLst>
-                                      </p:cBhvr>
-                                      <p:to>
-                                        <p:strVal val="visible"/>
-                                      </p:to>
-                                    </p:set>
-                                  </p:childTnLst>
-                                </p:cTn>
-                              </p:par>
-                            </p:childTnLst>
-                          </p:cTn>
-                        </p:par>
-                      </p:childTnLst>
-                    </p:cTn>
-                  </p:par>
-                  <p:par>
-                    <p:cTn id="41" fill="hold">
-                      <p:stCondLst>
-                        <p:cond delay="indefinite"/>
-                      </p:stCondLst>
-                      <p:childTnLst>
-                        <p:par>
-                          <p:cTn id="42" fill="hold">
-                            <p:stCondLst>
-                              <p:cond delay="0"/>
-                            </p:stCondLst>
-                            <p:childTnLst>
-                              <p:par>
-                                <p:cTn id="43" presetClass="entr" nodeType="clickEffect" presetSubtype="0" presetID="1" grpId="1" fill="hold">
-                                  <p:stCondLst>
-                                    <p:cond delay="0"/>
-                                  </p:stCondLst>
-                                  <p:iterate type="el" backwards="0">
-                                    <p:tmAbs val="0"/>
-                                  </p:iterate>
-                                  <p:childTnLst>
-                                    <p:set>
-                                      <p:cBhvr>
-                                        <p:cTn id="44" fill="hold"/>
-                                        <p:tgtEl>
-                                          <p:spTgt spid="57">
-                                            <p:txEl>
-                                              <p:pRg st="9" end="9"/>
-                                            </p:txEl>
-                                          </p:spTgt>
-                                        </p:tgtEl>
-                                        <p:attrNameLst>
-                                          <p:attrName>style.visibility</p:attrName>
-                                        </p:attrNameLst>
-                                      </p:cBhvr>
-                                      <p:to>
-                                        <p:strVal val="visible"/>
-                                      </p:to>
-                                    </p:set>
-                                  </p:childTnLst>
-                                </p:cTn>
-                              </p:par>
-                            </p:childTnLst>
-                          </p:cTn>
-                        </p:par>
-                      </p:childTnLst>
-                    </p:cTn>
-                  </p:par>
-                  <p:par>
-                    <p:cTn id="45" fill="hold">
-                      <p:stCondLst>
-                        <p:cond delay="indefinite"/>
-                      </p:stCondLst>
-                      <p:childTnLst>
-                        <p:par>
-                          <p:cTn id="46" fill="hold">
-                            <p:stCondLst>
-                              <p:cond delay="0"/>
-                            </p:stCondLst>
-                            <p:childTnLst>
-                              <p:par>
-                                <p:cTn id="47" presetClass="entr" nodeType="clickEffect" presetSubtype="0" presetID="1" grpId="1" fill="hold">
-                                  <p:stCondLst>
-                                    <p:cond delay="0"/>
-                                  </p:stCondLst>
-                                  <p:iterate type="el" backwards="0">
-                                    <p:tmAbs val="0"/>
-                                  </p:iterate>
-                                  <p:childTnLst>
-                                    <p:set>
-                                      <p:cBhvr>
-                                        <p:cTn id="48" fill="hold"/>
-                                        <p:tgtEl>
-                                          <p:spTgt spid="57">
-                                            <p:txEl>
-                                              <p:pRg st="10" end="10"/>
-                                            </p:txEl>
-                                          </p:spTgt>
-                                        </p:tgtEl>
-                                        <p:attrNameLst>
-                                          <p:attrName>style.visibility</p:attrName>
-                                        </p:attrNameLst>
-                                      </p:cBhvr>
-                                      <p:to>
-                                        <p:strVal val="visible"/>
-                                      </p:to>
-                                    </p:set>
-                                  </p:childTnLst>
-                                </p:cTn>
-                              </p:par>
-                            </p:childTnLst>
-                          </p:cTn>
-                        </p:par>
-                      </p:childTnLst>
-                    </p:cTn>
-                  </p:par>
-                  <p:par>
-                    <p:cTn id="49" fill="hold">
-                      <p:stCondLst>
-                        <p:cond delay="indefinite"/>
-                      </p:stCondLst>
-                      <p:childTnLst>
-                        <p:par>
-                          <p:cTn id="50" fill="hold">
-                            <p:stCondLst>
-                              <p:cond delay="0"/>
-                            </p:stCondLst>
-                            <p:childTnLst>
-                              <p:par>
-                                <p:cTn id="51" presetClass="entr" nodeType="clickEffect" presetSubtype="0" presetID="1" grpId="1" fill="hold">
-                                  <p:stCondLst>
-                                    <p:cond delay="0"/>
-                                  </p:stCondLst>
-                                  <p:iterate type="el" backwards="0">
-                                    <p:tmAbs val="0"/>
-                                  </p:iterate>
-                                  <p:childTnLst>
-                                    <p:set>
-                                      <p:cBhvr>
-                                        <p:cTn id="52" fill="hold"/>
-                                        <p:tgtEl>
-                                          <p:spTgt spid="57">
-                                            <p:txEl>
-                                              <p:pRg st="11" end="11"/>
-                                            </p:txEl>
-                                          </p:spTgt>
-                                        </p:tgtEl>
-                                        <p:attrNameLst>
-                                          <p:attrName>style.visibility</p:attrName>
-                                        </p:attrNameLst>
-                                      </p:cBhvr>
-                                      <p:to>
-                                        <p:strVal val="visible"/>
-                                      </p:to>
-                                    </p:set>
-                                  </p:childTnLst>
-                                </p:cTn>
-                              </p:par>
-                            </p:childTnLst>
-                          </p:cTn>
-                        </p:par>
-                      </p:childTnLst>
-                    </p:cTn>
-                  </p:par>
-                  <p:par>
-                    <p:cTn id="53" fill="hold">
-                      <p:stCondLst>
-                        <p:cond delay="indefinite"/>
-                      </p:stCondLst>
-                      <p:childTnLst>
-                        <p:par>
-                          <p:cTn id="54" fill="hold">
-                            <p:stCondLst>
-                              <p:cond delay="0"/>
-                            </p:stCondLst>
-                            <p:childTnLst>
-                              <p:par>
-                                <p:cTn id="55" presetClass="entr" nodeType="clickEffect" presetSubtype="0" presetID="1" grpId="1" fill="hold">
-                                  <p:stCondLst>
-                                    <p:cond delay="0"/>
-                                  </p:stCondLst>
-                                  <p:iterate type="el" backwards="0">
-                                    <p:tmAbs val="0"/>
-                                  </p:iterate>
-                                  <p:childTnLst>
-                                    <p:set>
-                                      <p:cBhvr>
-                                        <p:cTn id="56" fill="hold"/>
-                                        <p:tgtEl>
-                                          <p:spTgt spid="57">
-                                            <p:txEl>
-                                              <p:pRg st="12" end="12"/>
                                             </p:txEl>
                                           </p:spTgt>
                                         </p:tgtEl>
@@ -4948,13 +4220,13 @@
       </p:par>
     </p:tnLst>
     <p:bldLst>
-      <p:bldP build="p" bldLvl="5" animBg="1" rev="0" advAuto="0" spid="57" grpId="1"/>
+      <p:bldP build="p" bldLvl="5" animBg="1" rev="0" advAuto="0" spid="51" grpId="1"/>
     </p:bldLst>
   </p:timing>
 </p:sld>
 </file>
 
-<file path=ppt/slides/slide6.xml><?xml version="1.0" encoding="utf-8"?>
+<file path=ppt/slides/slide5.xml><?xml version="1.0" encoding="utf-8"?>
 <p:sld xmlns:a="http://schemas.openxmlformats.org/drawingml/2006/main" xmlns:r="http://schemas.openxmlformats.org/officeDocument/2006/relationships" xmlns:p="http://schemas.openxmlformats.org/presentationml/2006/main" xmlns:m="http://schemas.openxmlformats.org/officeDocument/2006/math" xmlns:a14="http://schemas.microsoft.com/office/drawing/2010/main" showMasterSp="1" showMasterPhAnim="1">
   <p:cSld>
     <p:spTree>
@@ -4973,7 +4245,7 @@
       </p:grpSpPr>
       <p:sp>
         <p:nvSpPr>
-          <p:cNvPr id="62" name="Initials.java (RPR) v2"/>
+          <p:cNvPr id="56" name="Exercise 1"/>
           <p:cNvSpPr txBox="1"/>
           <p:nvPr>
             <p:ph type="title"/>
@@ -4990,23 +4262,32 @@
           <a:p>
             <a:pPr/>
             <a:r>
-              <a:t>Initials.java (RPR) v2</a:t>
+              <a:t>Exercise </a:t>
+            </a:r>
+            <a:r>
+              <a:rPr>
+                <a:latin typeface="Arial"/>
+                <a:ea typeface="Arial"/>
+                <a:cs typeface="Arial"/>
+                <a:sym typeface="Arial"/>
+              </a:rPr>
+              <a:t>1</a:t>
             </a:r>
           </a:p>
         </p:txBody>
       </p:sp>
       <p:sp>
         <p:nvSpPr>
-          <p:cNvPr id="63" name="public class Initials {…"/>
+          <p:cNvPr id="57" name="Write a program Initials.java to print your initials using 9 rows with corresponding initial letter, e.g."/>
           <p:cNvSpPr txBox="1"/>
           <p:nvPr>
-            <p:ph type="body" idx="1"/>
+            <p:ph type="body" sz="quarter" idx="1"/>
           </p:nvPr>
         </p:nvSpPr>
         <p:spPr>
           <a:xfrm>
-            <a:off x="182140" y="938113"/>
-            <a:ext cx="9795720" cy="5891610"/>
+            <a:off x="555401" y="971979"/>
+            <a:ext cx="9277835" cy="1010598"/>
           </a:xfrm>
           <a:prstGeom prst="rect">
             <a:avLst/>
@@ -5016,205 +4297,30 @@
           <a:bodyPr/>
           <a:lstStyle/>
           <a:p>
-            <a:pPr marL="0" indent="0">
-              <a:buSzTx/>
-              <a:buNone/>
-              <a:defRPr sz="1900">
+            <a:pPr>
+              <a:defRPr sz="3000"/>
+            </a:pPr>
+            <a:r>
+              <a:t>Write a program </a:t>
+            </a:r>
+            <a:r>
+              <a:rPr>
                 <a:latin typeface="Courier New"/>
                 <a:ea typeface="Courier New"/>
                 <a:cs typeface="Courier New"/>
                 <a:sym typeface="Courier New"/>
-              </a:defRPr>
-            </a:pPr>
-            <a:r>
-              <a:t>public class Initials {</a:t>
-            </a:r>
-          </a:p>
-          <a:p>
-            <a:pPr marL="0" indent="0">
-              <a:buSzTx/>
-              <a:buNone/>
-              <a:defRPr sz="1900">
-                <a:latin typeface="Courier New"/>
-                <a:ea typeface="Courier New"/>
-                <a:cs typeface="Courier New"/>
-                <a:sym typeface="Courier New"/>
-              </a:defRPr>
-            </a:pPr>
-            <a:r>
-              <a:t>  public static void main(String[] args) {</a:t>
-            </a:r>
-          </a:p>
-          <a:p>
-            <a:pPr marL="0" indent="0">
-              <a:buSzTx/>
-              <a:buNone/>
-              <a:defRPr sz="1900">
-                <a:latin typeface="Courier New"/>
-                <a:ea typeface="Courier New"/>
-                <a:cs typeface="Courier New"/>
-                <a:sym typeface="Courier New"/>
-              </a:defRPr>
-            </a:pPr>
-            <a:r>
-              <a:t>    System.out.println("RRRRR        PPPPP        RRRRR        “);</a:t>
-            </a:r>
-          </a:p>
-          <a:p>
-            <a:pPr marL="0" indent="0">
-              <a:buSzTx/>
-              <a:buNone/>
-              <a:defRPr sz="1900">
-                <a:latin typeface="Courier New"/>
-                <a:ea typeface="Courier New"/>
-                <a:cs typeface="Courier New"/>
-                <a:sym typeface="Courier New"/>
-              </a:defRPr>
-            </a:pPr>
-            <a:r>
-              <a:t>    System.out.println("RR   RR      PP   PP      RR   RR      ");</a:t>
-            </a:r>
-          </a:p>
-          <a:p>
-            <a:pPr marL="0" indent="0">
-              <a:buSzTx/>
-              <a:buNone/>
-              <a:defRPr sz="1900">
-                <a:latin typeface="Courier New"/>
-                <a:ea typeface="Courier New"/>
-                <a:cs typeface="Courier New"/>
-                <a:sym typeface="Courier New"/>
-              </a:defRPr>
-            </a:pPr>
-            <a:r>
-              <a:t>    System.out.println("RR    RRR    PP    PPP    RR    RRR    ");</a:t>
-            </a:r>
-          </a:p>
-          <a:p>
-            <a:pPr marL="0" indent="0">
-              <a:buSzTx/>
-              <a:buNone/>
-              <a:defRPr sz="1900">
-                <a:latin typeface="Courier New"/>
-                <a:ea typeface="Courier New"/>
-                <a:cs typeface="Courier New"/>
-                <a:sym typeface="Courier New"/>
-              </a:defRPr>
-            </a:pPr>
-            <a:r>
-              <a:t>    System.out.println("RR    RRR    PP    PPP    RR   RRR     ");</a:t>
-            </a:r>
-          </a:p>
-          <a:p>
-            <a:pPr marL="0" indent="0">
-              <a:buSzTx/>
-              <a:buNone/>
-              <a:defRPr sz="1900">
-                <a:latin typeface="Courier New"/>
-                <a:ea typeface="Courier New"/>
-                <a:cs typeface="Courier New"/>
-                <a:sym typeface="Courier New"/>
-              </a:defRPr>
-            </a:pPr>
-            <a:r>
-              <a:t>    System.out.println("RR   RR      PP   PP      RR   RR      ");</a:t>
-            </a:r>
-          </a:p>
-          <a:p>
-            <a:pPr marL="0" indent="0">
-              <a:buSzTx/>
-              <a:buNone/>
-              <a:defRPr sz="1900">
-                <a:latin typeface="Courier New"/>
-                <a:ea typeface="Courier New"/>
-                <a:cs typeface="Courier New"/>
-                <a:sym typeface="Courier New"/>
-              </a:defRPr>
-            </a:pPr>
-            <a:r>
-              <a:t>    System.out.println("RRRRR        PPPPP        RRRRR        ");</a:t>
-            </a:r>
-          </a:p>
-          <a:p>
-            <a:pPr marL="0" indent="0">
-              <a:buSzTx/>
-              <a:buNone/>
-              <a:defRPr sz="1900">
-                <a:latin typeface="Courier New"/>
-                <a:ea typeface="Courier New"/>
-                <a:cs typeface="Courier New"/>
-                <a:sym typeface="Courier New"/>
-              </a:defRPr>
-            </a:pPr>
-            <a:r>
-              <a:t>    System.out.println("RR   RR      PP           RR   RR      ");</a:t>
-            </a:r>
-          </a:p>
-          <a:p>
-            <a:pPr marL="0" indent="0">
-              <a:buSzTx/>
-              <a:buNone/>
-              <a:defRPr sz="1900">
-                <a:latin typeface="Courier New"/>
-                <a:ea typeface="Courier New"/>
-                <a:cs typeface="Courier New"/>
-                <a:sym typeface="Courier New"/>
-              </a:defRPr>
-            </a:pPr>
-            <a:r>
-              <a:t>    System.out.println("RR     RR    PP           RR     RR    ");</a:t>
-            </a:r>
-          </a:p>
-          <a:p>
-            <a:pPr marL="0" indent="0">
-              <a:buSzTx/>
-              <a:buNone/>
-              <a:defRPr sz="1900">
-                <a:latin typeface="Courier New"/>
-                <a:ea typeface="Courier New"/>
-                <a:cs typeface="Courier New"/>
-                <a:sym typeface="Courier New"/>
-              </a:defRPr>
-            </a:pPr>
-            <a:r>
-              <a:t>    System.out.println("RR       RR  PP           RR       RR  ");</a:t>
-            </a:r>
-          </a:p>
-          <a:p>
-            <a:pPr marL="0" indent="0">
-              <a:buSzTx/>
-              <a:buNone/>
-              <a:defRPr sz="1900">
-                <a:latin typeface="Courier New"/>
-                <a:ea typeface="Courier New"/>
-                <a:cs typeface="Courier New"/>
-                <a:sym typeface="Courier New"/>
-              </a:defRPr>
-            </a:pPr>
-            <a:r>
-              <a:t>  }</a:t>
-            </a:r>
-          </a:p>
-          <a:p>
-            <a:pPr marL="0" indent="0">
-              <a:buSzTx/>
-              <a:buNone/>
-              <a:defRPr sz="1900">
-                <a:latin typeface="Courier New"/>
-                <a:ea typeface="Courier New"/>
-                <a:cs typeface="Courier New"/>
-                <a:sym typeface="Courier New"/>
-              </a:defRPr>
-            </a:pPr>
-            <a:r>
-              <a:t>}</a:t>
+              </a:rPr>
+              <a:t>Initials.java</a:t>
+            </a:r>
+            <a:r>
+              <a:t> to print your initials using 9 rows with corresponding initial letter, e.g.</a:t>
             </a:r>
           </a:p>
         </p:txBody>
       </p:sp>
       <p:sp>
         <p:nvSpPr>
-          <p:cNvPr id="64" name="Slide Number"/>
+          <p:cNvPr id="58" name="Slide Number"/>
           <p:cNvSpPr txBox="1"/>
           <p:nvPr>
             <p:ph type="sldNum" sz="quarter" idx="2"/>
@@ -5241,7 +4347,7 @@
       </p:sp>
       <p:sp>
         <p:nvSpPr>
-          <p:cNvPr id="65" name="DAA/Programming Overview"/>
+          <p:cNvPr id="59" name="DAA/Programming Overview"/>
           <p:cNvSpPr txBox="1"/>
           <p:nvPr/>
         </p:nvSpPr>
@@ -5281,7 +4387,7 @@
       </p:sp>
       <p:sp>
         <p:nvSpPr>
-          <p:cNvPr id="66" name="RPR/"/>
+          <p:cNvPr id="60" name="RPR/"/>
           <p:cNvSpPr txBox="1"/>
           <p:nvPr/>
         </p:nvSpPr>
@@ -5315,6 +4421,207 @@
             <a:pPr/>
             <a:r>
               <a:t>RPR/</a:t>
+            </a:r>
+          </a:p>
+        </p:txBody>
+      </p:sp>
+      <p:sp>
+        <p:nvSpPr>
+          <p:cNvPr id="61" name="RRRRR         PPPPP        RRRRR…"/>
+          <p:cNvSpPr txBox="1"/>
+          <p:nvPr/>
+        </p:nvSpPr>
+        <p:spPr>
+          <a:xfrm>
+            <a:off x="793061" y="2308611"/>
+            <a:ext cx="8802515" cy="4353561"/>
+          </a:xfrm>
+          <a:prstGeom prst="rect">
+            <a:avLst/>
+          </a:prstGeom>
+          <a:ln w="12700">
+            <a:miter lim="400000"/>
+          </a:ln>
+          <a:extLst>
+            <a:ext uri="{C572A759-6A51-4108-AA02-DFA0A04FC94B}">
+              <ma14:wrappingTextBoxFlag xmlns:ma14="http://schemas.microsoft.com/office/mac/drawingml/2011/main" val="1"/>
+            </a:ext>
+          </a:extLst>
+        </p:spPr>
+        <p:txBody>
+          <a:bodyPr wrap="none" lIns="50800" tIns="50800" rIns="50800" bIns="50800" anchor="ctr">
+            <a:spAutoFit/>
+          </a:bodyPr>
+          <a:lstStyle/>
+          <a:p>
+            <a:pPr marL="0">
+              <a:lnSpc>
+                <a:spcPct val="90000"/>
+              </a:lnSpc>
+              <a:spcBef>
+                <a:spcPts val="700"/>
+              </a:spcBef>
+              <a:defRPr b="1" sz="3000">
+                <a:latin typeface="Courier New"/>
+                <a:ea typeface="Courier New"/>
+                <a:cs typeface="Courier New"/>
+                <a:sym typeface="Courier New"/>
+              </a:defRPr>
+            </a:pPr>
+            <a:r>
+              <a:t>RRRRR         PPPPP        RRRRR </a:t>
+            </a:r>
+          </a:p>
+          <a:p>
+            <a:pPr marL="0">
+              <a:lnSpc>
+                <a:spcPct val="90000"/>
+              </a:lnSpc>
+              <a:spcBef>
+                <a:spcPts val="700"/>
+              </a:spcBef>
+              <a:defRPr b="1" sz="3000">
+                <a:latin typeface="Courier New"/>
+                <a:ea typeface="Courier New"/>
+                <a:cs typeface="Courier New"/>
+                <a:sym typeface="Courier New"/>
+              </a:defRPr>
+            </a:pPr>
+            <a:r>
+              <a:t>RR   RR       PP   PP      RR   RR </a:t>
+            </a:r>
+          </a:p>
+          <a:p>
+            <a:pPr marL="0">
+              <a:lnSpc>
+                <a:spcPct val="90000"/>
+              </a:lnSpc>
+              <a:spcBef>
+                <a:spcPts val="700"/>
+              </a:spcBef>
+              <a:defRPr b="1" sz="3000">
+                <a:latin typeface="Courier New"/>
+                <a:ea typeface="Courier New"/>
+                <a:cs typeface="Courier New"/>
+                <a:sym typeface="Courier New"/>
+              </a:defRPr>
+            </a:pPr>
+            <a:r>
+              <a:t>RR    RRR     PP    PPP    RR    RRR </a:t>
+            </a:r>
+          </a:p>
+          <a:p>
+            <a:pPr marL="0">
+              <a:lnSpc>
+                <a:spcPct val="90000"/>
+              </a:lnSpc>
+              <a:spcBef>
+                <a:spcPts val="700"/>
+              </a:spcBef>
+              <a:defRPr b="1" sz="3000">
+                <a:latin typeface="Courier New"/>
+                <a:ea typeface="Courier New"/>
+                <a:cs typeface="Courier New"/>
+                <a:sym typeface="Courier New"/>
+              </a:defRPr>
+            </a:pPr>
+            <a:r>
+              <a:t>RR    RRR     PP    PPP    RR   RRR </a:t>
+            </a:r>
+          </a:p>
+          <a:p>
+            <a:pPr marL="0">
+              <a:lnSpc>
+                <a:spcPct val="90000"/>
+              </a:lnSpc>
+              <a:spcBef>
+                <a:spcPts val="700"/>
+              </a:spcBef>
+              <a:defRPr b="1" sz="3000">
+                <a:latin typeface="Courier New"/>
+                <a:ea typeface="Courier New"/>
+                <a:cs typeface="Courier New"/>
+                <a:sym typeface="Courier New"/>
+              </a:defRPr>
+            </a:pPr>
+            <a:r>
+              <a:t>RR   RR       PP   PP      RR   RR </a:t>
+            </a:r>
+          </a:p>
+          <a:p>
+            <a:pPr marL="0">
+              <a:lnSpc>
+                <a:spcPct val="90000"/>
+              </a:lnSpc>
+              <a:spcBef>
+                <a:spcPts val="700"/>
+              </a:spcBef>
+              <a:defRPr b="1" sz="3000">
+                <a:latin typeface="Courier New"/>
+                <a:ea typeface="Courier New"/>
+                <a:cs typeface="Courier New"/>
+                <a:sym typeface="Courier New"/>
+              </a:defRPr>
+            </a:pPr>
+            <a:r>
+              <a:t>RRRRR         PPPPP        RRRRR  </a:t>
+            </a:r>
+          </a:p>
+          <a:p>
+            <a:pPr marL="0">
+              <a:lnSpc>
+                <a:spcPct val="90000"/>
+              </a:lnSpc>
+              <a:spcBef>
+                <a:spcPts val="700"/>
+              </a:spcBef>
+              <a:defRPr b="1" sz="3000">
+                <a:latin typeface="Courier New"/>
+                <a:ea typeface="Courier New"/>
+                <a:cs typeface="Courier New"/>
+                <a:sym typeface="Courier New"/>
+              </a:defRPr>
+            </a:pPr>
+            <a:r>
+              <a:t>RR   RR       PP           RR   RR </a:t>
+            </a:r>
+          </a:p>
+          <a:p>
+            <a:pPr marL="0">
+              <a:lnSpc>
+                <a:spcPct val="90000"/>
+              </a:lnSpc>
+              <a:spcBef>
+                <a:spcPts val="700"/>
+              </a:spcBef>
+              <a:defRPr b="1" sz="3000">
+                <a:latin typeface="Courier New"/>
+                <a:ea typeface="Courier New"/>
+                <a:cs typeface="Courier New"/>
+                <a:sym typeface="Courier New"/>
+              </a:defRPr>
+            </a:pPr>
+            <a:r>
+              <a:t>RR     RR     PP           RR     RR </a:t>
+            </a:r>
+          </a:p>
+          <a:p>
+            <a:pPr marL="0">
+              <a:lnSpc>
+                <a:spcPct val="90000"/>
+              </a:lnSpc>
+              <a:spcBef>
+                <a:spcPts val="700"/>
+              </a:spcBef>
+              <a:defRPr b="1" sz="3000">
+                <a:latin typeface="Courier New"/>
+                <a:ea typeface="Courier New"/>
+                <a:cs typeface="Courier New"/>
+                <a:sym typeface="Courier New"/>
+              </a:defRPr>
+            </a:pPr>
+            <a:r>
+              <a:t>RR       RR   PP           RR       RR</a:t>
             </a:r>
           </a:p>
         </p:txBody>
@@ -5358,7 +4665,1097 @@
                                       <p:cBhvr>
                                         <p:cTn id="6" fill="hold"/>
                                         <p:tgtEl>
-                                          <p:spTgt spid="63">
+                                          <p:spTgt spid="57"/>
+                                        </p:tgtEl>
+                                        <p:attrNameLst>
+                                          <p:attrName>style.visibility</p:attrName>
+                                        </p:attrNameLst>
+                                      </p:cBhvr>
+                                      <p:to>
+                                        <p:strVal val="visible"/>
+                                      </p:to>
+                                    </p:set>
+                                  </p:childTnLst>
+                                </p:cTn>
+                              </p:par>
+                            </p:childTnLst>
+                          </p:cTn>
+                        </p:par>
+                      </p:childTnLst>
+                    </p:cTn>
+                  </p:par>
+                  <p:par>
+                    <p:cTn id="7" fill="hold">
+                      <p:stCondLst>
+                        <p:cond delay="indefinite"/>
+                      </p:stCondLst>
+                      <p:childTnLst>
+                        <p:par>
+                          <p:cTn id="8" fill="hold">
+                            <p:stCondLst>
+                              <p:cond delay="0"/>
+                            </p:stCondLst>
+                            <p:childTnLst>
+                              <p:par>
+                                <p:cTn id="9" presetClass="entr" nodeType="clickEffect" presetSubtype="0" presetID="1" grpId="2" fill="hold">
+                                  <p:stCondLst>
+                                    <p:cond delay="0"/>
+                                  </p:stCondLst>
+                                  <p:iterate type="el" backwards="0">
+                                    <p:tmAbs val="0"/>
+                                  </p:iterate>
+                                  <p:childTnLst>
+                                    <p:set>
+                                      <p:cBhvr>
+                                        <p:cTn id="10" fill="hold"/>
+                                        <p:tgtEl>
+                                          <p:spTgt spid="61"/>
+                                        </p:tgtEl>
+                                        <p:attrNameLst>
+                                          <p:attrName>style.visibility</p:attrName>
+                                        </p:attrNameLst>
+                                      </p:cBhvr>
+                                      <p:to>
+                                        <p:strVal val="visible"/>
+                                      </p:to>
+                                    </p:set>
+                                  </p:childTnLst>
+                                </p:cTn>
+                              </p:par>
+                            </p:childTnLst>
+                          </p:cTn>
+                        </p:par>
+                      </p:childTnLst>
+                    </p:cTn>
+                  </p:par>
+                </p:childTnLst>
+              </p:cTn>
+              <p:prevCondLst>
+                <p:cond evt="onPrev">
+                  <p:tgtEl>
+                    <p:sldTgt/>
+                  </p:tgtEl>
+                </p:cond>
+              </p:prevCondLst>
+              <p:nextCondLst>
+                <p:cond evt="onNext">
+                  <p:tgtEl>
+                    <p:sldTgt/>
+                  </p:tgtEl>
+                </p:cond>
+              </p:nextCondLst>
+            </p:seq>
+          </p:childTnLst>
+        </p:cTn>
+      </p:par>
+    </p:tnLst>
+    <p:bldLst>
+      <p:bldP build="whole" bldLvl="1" animBg="1" rev="0" advAuto="0" spid="61" grpId="2"/>
+      <p:bldP build="whole" bldLvl="1" animBg="1" rev="0" advAuto="0" spid="57" grpId="1"/>
+    </p:bldLst>
+  </p:timing>
+</p:sld>
+</file>
+
+<file path=ppt/slides/slide6.xml><?xml version="1.0" encoding="utf-8"?>
+<p:sld xmlns:a="http://schemas.openxmlformats.org/drawingml/2006/main" xmlns:r="http://schemas.openxmlformats.org/officeDocument/2006/relationships" xmlns:p="http://schemas.openxmlformats.org/presentationml/2006/main" xmlns:m="http://schemas.openxmlformats.org/officeDocument/2006/math" xmlns:a14="http://schemas.microsoft.com/office/drawing/2010/main" showMasterSp="1" showMasterPhAnim="1">
+  <p:cSld>
+    <p:spTree>
+      <p:nvGrpSpPr>
+        <p:cNvPr id="1" name=""/>
+        <p:cNvGrpSpPr/>
+        <p:nvPr/>
+      </p:nvGrpSpPr>
+      <p:grpSpPr>
+        <a:xfrm>
+          <a:off x="0" y="0"/>
+          <a:ext cx="0" cy="0"/>
+          <a:chOff x="0" y="0"/>
+          <a:chExt cx="0" cy="0"/>
+        </a:xfrm>
+      </p:grpSpPr>
+      <p:sp>
+        <p:nvSpPr>
+          <p:cNvPr id="63" name="Initials.java (RPR) - v1"/>
+          <p:cNvSpPr txBox="1"/>
+          <p:nvPr>
+            <p:ph type="title"/>
+          </p:nvPr>
+        </p:nvSpPr>
+        <p:spPr>
+          <a:prstGeom prst="rect">
+            <a:avLst/>
+          </a:prstGeom>
+        </p:spPr>
+        <p:txBody>
+          <a:bodyPr/>
+          <a:lstStyle/>
+          <a:p>
+            <a:pPr/>
+            <a:r>
+              <a:t>Initials.java (RPR) - </a:t>
+            </a:r>
+            <a:r>
+              <a:rPr>
+                <a:latin typeface="Arial"/>
+                <a:ea typeface="Arial"/>
+                <a:cs typeface="Arial"/>
+                <a:sym typeface="Arial"/>
+              </a:rPr>
+              <a:t>v1</a:t>
+            </a:r>
+          </a:p>
+        </p:txBody>
+      </p:sp>
+      <p:sp>
+        <p:nvSpPr>
+          <p:cNvPr id="64" name="public class Initials {…"/>
+          <p:cNvSpPr txBox="1"/>
+          <p:nvPr>
+            <p:ph type="body" idx="1"/>
+          </p:nvPr>
+        </p:nvSpPr>
+        <p:spPr>
+          <a:xfrm>
+            <a:off x="182140" y="938113"/>
+            <a:ext cx="9795720" cy="5891610"/>
+          </a:xfrm>
+          <a:prstGeom prst="rect">
+            <a:avLst/>
+          </a:prstGeom>
+        </p:spPr>
+        <p:txBody>
+          <a:bodyPr/>
+          <a:lstStyle/>
+          <a:p>
+            <a:pPr marL="0" indent="0">
+              <a:buSzTx/>
+              <a:buNone/>
+              <a:defRPr sz="1900">
+                <a:latin typeface="Courier New"/>
+                <a:ea typeface="Courier New"/>
+                <a:cs typeface="Courier New"/>
+                <a:sym typeface="Courier New"/>
+              </a:defRPr>
+            </a:pPr>
+            <a:r>
+              <a:t>public class Initials {</a:t>
+            </a:r>
+          </a:p>
+          <a:p>
+            <a:pPr marL="0" indent="0">
+              <a:buSzTx/>
+              <a:buNone/>
+              <a:defRPr sz="1900">
+                <a:latin typeface="Courier New"/>
+                <a:ea typeface="Courier New"/>
+                <a:cs typeface="Courier New"/>
+                <a:sym typeface="Courier New"/>
+              </a:defRPr>
+            </a:pPr>
+            <a:r>
+              <a:t>  public static void main(String[] args) {</a:t>
+            </a:r>
+          </a:p>
+          <a:p>
+            <a:pPr marL="0" indent="0">
+              <a:buSzTx/>
+              <a:buNone/>
+              <a:defRPr sz="1900">
+                <a:latin typeface="Courier New"/>
+                <a:ea typeface="Courier New"/>
+                <a:cs typeface="Courier New"/>
+                <a:sym typeface="Courier New"/>
+              </a:defRPr>
+            </a:pPr>
+            <a:r>
+              <a:t>    System.out.println("RRRRR        PPPPP        RRRRR ");</a:t>
+            </a:r>
+          </a:p>
+          <a:p>
+            <a:pPr marL="0" indent="0">
+              <a:buSzTx/>
+              <a:buNone/>
+              <a:defRPr sz="1900">
+                <a:latin typeface="Courier New"/>
+                <a:ea typeface="Courier New"/>
+                <a:cs typeface="Courier New"/>
+                <a:sym typeface="Courier New"/>
+              </a:defRPr>
+            </a:pPr>
+            <a:r>
+              <a:t>    System.out.println("RR   RR      PP   PP      RR   RR");</a:t>
+            </a:r>
+          </a:p>
+          <a:p>
+            <a:pPr marL="0" indent="0">
+              <a:buSzTx/>
+              <a:buNone/>
+              <a:defRPr sz="1900">
+                <a:latin typeface="Courier New"/>
+                <a:ea typeface="Courier New"/>
+                <a:cs typeface="Courier New"/>
+                <a:sym typeface="Courier New"/>
+              </a:defRPr>
+            </a:pPr>
+            <a:r>
+              <a:t>    System.out.println("RR    RRR    PP    PPP    RR    RRR ");</a:t>
+            </a:r>
+          </a:p>
+          <a:p>
+            <a:pPr marL="0" indent="0">
+              <a:buSzTx/>
+              <a:buNone/>
+              <a:defRPr sz="1900">
+                <a:latin typeface="Courier New"/>
+                <a:ea typeface="Courier New"/>
+                <a:cs typeface="Courier New"/>
+                <a:sym typeface="Courier New"/>
+              </a:defRPr>
+            </a:pPr>
+            <a:r>
+              <a:t>    System.out.println("RR    RRR    PP    PPP    RR   RRR ");</a:t>
+            </a:r>
+          </a:p>
+          <a:p>
+            <a:pPr marL="0" indent="0">
+              <a:buSzTx/>
+              <a:buNone/>
+              <a:defRPr sz="1900">
+                <a:latin typeface="Courier New"/>
+                <a:ea typeface="Courier New"/>
+                <a:cs typeface="Courier New"/>
+                <a:sym typeface="Courier New"/>
+              </a:defRPr>
+            </a:pPr>
+            <a:r>
+              <a:t>    System.out.println("RR   RR      PP   PP      RR   RR ");</a:t>
+            </a:r>
+          </a:p>
+          <a:p>
+            <a:pPr marL="0" indent="0">
+              <a:buSzTx/>
+              <a:buNone/>
+              <a:defRPr sz="1900">
+                <a:latin typeface="Courier New"/>
+                <a:ea typeface="Courier New"/>
+                <a:cs typeface="Courier New"/>
+                <a:sym typeface="Courier New"/>
+              </a:defRPr>
+            </a:pPr>
+            <a:r>
+              <a:t>    System.out.println("RRRRR        PPPPP        RRRRR  ");</a:t>
+            </a:r>
+          </a:p>
+          <a:p>
+            <a:pPr marL="0" indent="0">
+              <a:buSzTx/>
+              <a:buNone/>
+              <a:defRPr sz="1900">
+                <a:latin typeface="Courier New"/>
+                <a:ea typeface="Courier New"/>
+                <a:cs typeface="Courier New"/>
+                <a:sym typeface="Courier New"/>
+              </a:defRPr>
+            </a:pPr>
+            <a:r>
+              <a:t>    System.out.println("RR   RR      PP           RR   RR");</a:t>
+            </a:r>
+          </a:p>
+          <a:p>
+            <a:pPr marL="0" indent="0">
+              <a:buSzTx/>
+              <a:buNone/>
+              <a:defRPr sz="1900">
+                <a:latin typeface="Courier New"/>
+                <a:ea typeface="Courier New"/>
+                <a:cs typeface="Courier New"/>
+                <a:sym typeface="Courier New"/>
+              </a:defRPr>
+            </a:pPr>
+            <a:r>
+              <a:t>    System.out.println("RR     RR    PP           RR     RR");</a:t>
+            </a:r>
+          </a:p>
+          <a:p>
+            <a:pPr marL="0" indent="0">
+              <a:buSzTx/>
+              <a:buNone/>
+              <a:defRPr sz="1900">
+                <a:latin typeface="Courier New"/>
+                <a:ea typeface="Courier New"/>
+                <a:cs typeface="Courier New"/>
+                <a:sym typeface="Courier New"/>
+              </a:defRPr>
+            </a:pPr>
+            <a:r>
+              <a:t>    System.out.println("RR       RR  PP           RR       RR");</a:t>
+            </a:r>
+          </a:p>
+          <a:p>
+            <a:pPr marL="0" indent="0">
+              <a:buSzTx/>
+              <a:buNone/>
+              <a:defRPr sz="1900">
+                <a:latin typeface="Courier New"/>
+                <a:ea typeface="Courier New"/>
+                <a:cs typeface="Courier New"/>
+                <a:sym typeface="Courier New"/>
+              </a:defRPr>
+            </a:pPr>
+            <a:r>
+              <a:t>  }</a:t>
+            </a:r>
+          </a:p>
+          <a:p>
+            <a:pPr marL="0" indent="0">
+              <a:buSzTx/>
+              <a:buNone/>
+              <a:defRPr sz="1900">
+                <a:latin typeface="Courier New"/>
+                <a:ea typeface="Courier New"/>
+                <a:cs typeface="Courier New"/>
+                <a:sym typeface="Courier New"/>
+              </a:defRPr>
+            </a:pPr>
+            <a:r>
+              <a:t>}</a:t>
+            </a:r>
+          </a:p>
+        </p:txBody>
+      </p:sp>
+      <p:sp>
+        <p:nvSpPr>
+          <p:cNvPr id="65" name="Slide Number"/>
+          <p:cNvSpPr txBox="1"/>
+          <p:nvPr>
+            <p:ph type="sldNum" sz="quarter" idx="2"/>
+          </p:nvPr>
+        </p:nvSpPr>
+        <p:spPr>
+          <a:prstGeom prst="rect">
+            <a:avLst/>
+          </a:prstGeom>
+          <a:extLst>
+            <a:ext uri="{C572A759-6A51-4108-AA02-DFA0A04FC94B}">
+              <ma14:wrappingTextBoxFlag xmlns:ma14="http://schemas.microsoft.com/office/mac/drawingml/2011/main" val="1"/>
+            </a:ext>
+          </a:extLst>
+        </p:spPr>
+        <p:txBody>
+          <a:bodyPr/>
+          <a:lstStyle/>
+          <a:p>
+            <a:pPr/>
+            <a:fld id="{86CB4B4D-7CA3-9044-876B-883B54F8677D}" type="slidenum"/>
+          </a:p>
+        </p:txBody>
+      </p:sp>
+      <p:sp>
+        <p:nvSpPr>
+          <p:cNvPr id="66" name="DAA/Programming Overview"/>
+          <p:cNvSpPr txBox="1"/>
+          <p:nvPr/>
+        </p:nvSpPr>
+        <p:spPr>
+          <a:xfrm>
+            <a:off x="423212" y="6963885"/>
+            <a:ext cx="3854213" cy="431552"/>
+          </a:xfrm>
+          <a:prstGeom prst="rect">
+            <a:avLst/>
+          </a:prstGeom>
+          <a:ln w="12700">
+            <a:miter lim="400000"/>
+          </a:ln>
+          <a:extLst>
+            <a:ext uri="{C572A759-6A51-4108-AA02-DFA0A04FC94B}">
+              <ma14:wrappingTextBoxFlag xmlns:ma14="http://schemas.microsoft.com/office/mac/drawingml/2011/main" val="1"/>
+            </a:ext>
+          </a:extLst>
+        </p:spPr>
+        <p:txBody>
+          <a:bodyPr wrap="none" lIns="50800" tIns="50800" rIns="50800" bIns="50800" anchor="ctr">
+            <a:spAutoFit/>
+          </a:bodyPr>
+          <a:lstStyle>
+            <a:lvl1pPr>
+              <a:defRPr sz="2400"/>
+            </a:lvl1pPr>
+          </a:lstStyle>
+          <a:p>
+            <a:pPr/>
+            <a:r>
+              <a:t>DAA/Programming Overview</a:t>
+            </a:r>
+          </a:p>
+        </p:txBody>
+      </p:sp>
+      <p:sp>
+        <p:nvSpPr>
+          <p:cNvPr id="67" name="RPR/"/>
+          <p:cNvSpPr txBox="1"/>
+          <p:nvPr/>
+        </p:nvSpPr>
+        <p:spPr>
+          <a:xfrm>
+            <a:off x="7535212" y="6988206"/>
+            <a:ext cx="705605" cy="382910"/>
+          </a:xfrm>
+          <a:prstGeom prst="rect">
+            <a:avLst/>
+          </a:prstGeom>
+          <a:ln w="12700">
+            <a:miter lim="400000"/>
+          </a:ln>
+          <a:extLst>
+            <a:ext uri="{C572A759-6A51-4108-AA02-DFA0A04FC94B}">
+              <ma14:wrappingTextBoxFlag xmlns:ma14="http://schemas.microsoft.com/office/mac/drawingml/2011/main" val="1"/>
+            </a:ext>
+          </a:extLst>
+        </p:spPr>
+        <p:txBody>
+          <a:bodyPr wrap="none" lIns="50800" tIns="50800" rIns="50800" bIns="50800" anchor="ctr">
+            <a:spAutoFit/>
+          </a:bodyPr>
+          <a:lstStyle>
+            <a:lvl1pPr>
+              <a:defRPr sz="2000"/>
+            </a:lvl1pPr>
+          </a:lstStyle>
+          <a:p>
+            <a:pPr/>
+            <a:r>
+              <a:t>RPR/</a:t>
+            </a:r>
+          </a:p>
+        </p:txBody>
+      </p:sp>
+    </p:spTree>
+  </p:cSld>
+  <p:clrMapOvr>
+    <a:masterClrMapping/>
+  </p:clrMapOvr>
+  <p:transition xmlns:p14="http://schemas.microsoft.com/office/powerpoint/2010/main" spd="med" advClick="1"/>
+</p:sld>
+</file>
+
+<file path=ppt/slides/slide7.xml><?xml version="1.0" encoding="utf-8"?>
+<p:sld xmlns:a="http://schemas.openxmlformats.org/drawingml/2006/main" xmlns:r="http://schemas.openxmlformats.org/officeDocument/2006/relationships" xmlns:p="http://schemas.openxmlformats.org/presentationml/2006/main" xmlns:m="http://schemas.openxmlformats.org/officeDocument/2006/math" xmlns:a14="http://schemas.microsoft.com/office/drawing/2010/main" showMasterSp="1" showMasterPhAnim="1">
+  <p:cSld>
+    <p:spTree>
+      <p:nvGrpSpPr>
+        <p:cNvPr id="1" name=""/>
+        <p:cNvGrpSpPr/>
+        <p:nvPr/>
+      </p:nvGrpSpPr>
+      <p:grpSpPr>
+        <a:xfrm>
+          <a:off x="0" y="0"/>
+          <a:ext cx="0" cy="0"/>
+          <a:chOff x="0" y="0"/>
+          <a:chExt cx="0" cy="0"/>
+        </a:xfrm>
+      </p:grpSpPr>
+      <p:sp>
+        <p:nvSpPr>
+          <p:cNvPr id="69" name="Initials.java (RPR) v2"/>
+          <p:cNvSpPr txBox="1"/>
+          <p:nvPr>
+            <p:ph type="title"/>
+          </p:nvPr>
+        </p:nvSpPr>
+        <p:spPr>
+          <a:prstGeom prst="rect">
+            <a:avLst/>
+          </a:prstGeom>
+        </p:spPr>
+        <p:txBody>
+          <a:bodyPr/>
+          <a:lstStyle/>
+          <a:p>
+            <a:pPr/>
+            <a:r>
+              <a:t>Initials.java (RPR) v2</a:t>
+            </a:r>
+          </a:p>
+        </p:txBody>
+      </p:sp>
+      <p:sp>
+        <p:nvSpPr>
+          <p:cNvPr id="70" name="public class Initials {…"/>
+          <p:cNvSpPr txBox="1"/>
+          <p:nvPr>
+            <p:ph type="body" idx="1"/>
+          </p:nvPr>
+        </p:nvSpPr>
+        <p:spPr>
+          <a:xfrm>
+            <a:off x="182140" y="938113"/>
+            <a:ext cx="9795720" cy="5891610"/>
+          </a:xfrm>
+          <a:prstGeom prst="rect">
+            <a:avLst/>
+          </a:prstGeom>
+        </p:spPr>
+        <p:txBody>
+          <a:bodyPr/>
+          <a:lstStyle/>
+          <a:p>
+            <a:pPr marL="0" indent="0">
+              <a:buSzTx/>
+              <a:buNone/>
+              <a:defRPr sz="1900">
+                <a:latin typeface="Courier New"/>
+                <a:ea typeface="Courier New"/>
+                <a:cs typeface="Courier New"/>
+                <a:sym typeface="Courier New"/>
+              </a:defRPr>
+            </a:pPr>
+            <a:r>
+              <a:t>public class Initials {</a:t>
+            </a:r>
+          </a:p>
+          <a:p>
+            <a:pPr marL="0" indent="0">
+              <a:buSzTx/>
+              <a:buNone/>
+              <a:defRPr sz="1900">
+                <a:latin typeface="Courier New"/>
+                <a:ea typeface="Courier New"/>
+                <a:cs typeface="Courier New"/>
+                <a:sym typeface="Courier New"/>
+              </a:defRPr>
+            </a:pPr>
+            <a:r>
+              <a:t>  public static void main(String[] args) {</a:t>
+            </a:r>
+          </a:p>
+          <a:p>
+            <a:pPr marL="0" indent="0">
+              <a:buSzTx/>
+              <a:buNone/>
+              <a:defRPr sz="1900">
+                <a:latin typeface="Courier New"/>
+                <a:ea typeface="Courier New"/>
+                <a:cs typeface="Courier New"/>
+                <a:sym typeface="Courier New"/>
+              </a:defRPr>
+            </a:pPr>
+            <a:r>
+              <a:t>    System.out.println("RRRRR        PPPPP        RRRRR        “);</a:t>
+            </a:r>
+          </a:p>
+          <a:p>
+            <a:pPr marL="0" indent="0">
+              <a:buSzTx/>
+              <a:buNone/>
+              <a:defRPr sz="1900">
+                <a:latin typeface="Courier New"/>
+                <a:ea typeface="Courier New"/>
+                <a:cs typeface="Courier New"/>
+                <a:sym typeface="Courier New"/>
+              </a:defRPr>
+            </a:pPr>
+            <a:r>
+              <a:t>    System.out.println("RR   RR      PP   PP      RR   RR      ");</a:t>
+            </a:r>
+          </a:p>
+          <a:p>
+            <a:pPr marL="0" indent="0">
+              <a:buSzTx/>
+              <a:buNone/>
+              <a:defRPr sz="1900">
+                <a:latin typeface="Courier New"/>
+                <a:ea typeface="Courier New"/>
+                <a:cs typeface="Courier New"/>
+                <a:sym typeface="Courier New"/>
+              </a:defRPr>
+            </a:pPr>
+            <a:r>
+              <a:t>    System.out.println("RR    RRR    PP    PPP    RR    RRR    ");</a:t>
+            </a:r>
+          </a:p>
+          <a:p>
+            <a:pPr marL="0" indent="0">
+              <a:buSzTx/>
+              <a:buNone/>
+              <a:defRPr sz="1900">
+                <a:latin typeface="Courier New"/>
+                <a:ea typeface="Courier New"/>
+                <a:cs typeface="Courier New"/>
+                <a:sym typeface="Courier New"/>
+              </a:defRPr>
+            </a:pPr>
+            <a:r>
+              <a:t>    System.out.println("RR    RRR    PP    PPP    RR   RRR     ");</a:t>
+            </a:r>
+          </a:p>
+          <a:p>
+            <a:pPr marL="0" indent="0">
+              <a:buSzTx/>
+              <a:buNone/>
+              <a:defRPr sz="1900">
+                <a:latin typeface="Courier New"/>
+                <a:ea typeface="Courier New"/>
+                <a:cs typeface="Courier New"/>
+                <a:sym typeface="Courier New"/>
+              </a:defRPr>
+            </a:pPr>
+            <a:r>
+              <a:t>    System.out.println("RR   RR      PP   PP      RR   RR      ");</a:t>
+            </a:r>
+          </a:p>
+          <a:p>
+            <a:pPr marL="0" indent="0">
+              <a:buSzTx/>
+              <a:buNone/>
+              <a:defRPr sz="1900">
+                <a:latin typeface="Courier New"/>
+                <a:ea typeface="Courier New"/>
+                <a:cs typeface="Courier New"/>
+                <a:sym typeface="Courier New"/>
+              </a:defRPr>
+            </a:pPr>
+            <a:r>
+              <a:t>    System.out.println("RRRRR        PPPPP        RRRRR        ");</a:t>
+            </a:r>
+          </a:p>
+          <a:p>
+            <a:pPr marL="0" indent="0">
+              <a:buSzTx/>
+              <a:buNone/>
+              <a:defRPr sz="1900">
+                <a:latin typeface="Courier New"/>
+                <a:ea typeface="Courier New"/>
+                <a:cs typeface="Courier New"/>
+                <a:sym typeface="Courier New"/>
+              </a:defRPr>
+            </a:pPr>
+            <a:r>
+              <a:t>    System.out.println("RR   RR      PP           RR   RR      ");</a:t>
+            </a:r>
+          </a:p>
+          <a:p>
+            <a:pPr marL="0" indent="0">
+              <a:buSzTx/>
+              <a:buNone/>
+              <a:defRPr sz="1900">
+                <a:latin typeface="Courier New"/>
+                <a:ea typeface="Courier New"/>
+                <a:cs typeface="Courier New"/>
+                <a:sym typeface="Courier New"/>
+              </a:defRPr>
+            </a:pPr>
+            <a:r>
+              <a:t>    System.out.println("RR     RR    PP           RR     RR    ");</a:t>
+            </a:r>
+          </a:p>
+          <a:p>
+            <a:pPr marL="0" indent="0">
+              <a:buSzTx/>
+              <a:buNone/>
+              <a:defRPr sz="1900">
+                <a:latin typeface="Courier New"/>
+                <a:ea typeface="Courier New"/>
+                <a:cs typeface="Courier New"/>
+                <a:sym typeface="Courier New"/>
+              </a:defRPr>
+            </a:pPr>
+            <a:r>
+              <a:t>    System.out.println("RR       RR  PP           RR       RR  ");</a:t>
+            </a:r>
+          </a:p>
+          <a:p>
+            <a:pPr marL="0" indent="0">
+              <a:buSzTx/>
+              <a:buNone/>
+              <a:defRPr sz="1900">
+                <a:latin typeface="Courier New"/>
+                <a:ea typeface="Courier New"/>
+                <a:cs typeface="Courier New"/>
+                <a:sym typeface="Courier New"/>
+              </a:defRPr>
+            </a:pPr>
+            <a:r>
+              <a:t>  }</a:t>
+            </a:r>
+          </a:p>
+          <a:p>
+            <a:pPr marL="0" indent="0">
+              <a:buSzTx/>
+              <a:buNone/>
+              <a:defRPr sz="1900">
+                <a:latin typeface="Courier New"/>
+                <a:ea typeface="Courier New"/>
+                <a:cs typeface="Courier New"/>
+                <a:sym typeface="Courier New"/>
+              </a:defRPr>
+            </a:pPr>
+            <a:r>
+              <a:t>}</a:t>
+            </a:r>
+          </a:p>
+        </p:txBody>
+      </p:sp>
+      <p:sp>
+        <p:nvSpPr>
+          <p:cNvPr id="71" name="Slide Number"/>
+          <p:cNvSpPr txBox="1"/>
+          <p:nvPr>
+            <p:ph type="sldNum" sz="quarter" idx="2"/>
+          </p:nvPr>
+        </p:nvSpPr>
+        <p:spPr>
+          <a:prstGeom prst="rect">
+            <a:avLst/>
+          </a:prstGeom>
+          <a:extLst>
+            <a:ext uri="{C572A759-6A51-4108-AA02-DFA0A04FC94B}">
+              <ma14:wrappingTextBoxFlag xmlns:ma14="http://schemas.microsoft.com/office/mac/drawingml/2011/main" val="1"/>
+            </a:ext>
+          </a:extLst>
+        </p:spPr>
+        <p:txBody>
+          <a:bodyPr/>
+          <a:lstStyle/>
+          <a:p>
+            <a:pPr/>
+            <a:fld id="{86CB4B4D-7CA3-9044-876B-883B54F8677D}" type="slidenum"/>
+          </a:p>
+        </p:txBody>
+      </p:sp>
+      <p:sp>
+        <p:nvSpPr>
+          <p:cNvPr id="72" name="DAA/Programming Overview"/>
+          <p:cNvSpPr txBox="1"/>
+          <p:nvPr/>
+        </p:nvSpPr>
+        <p:spPr>
+          <a:xfrm>
+            <a:off x="423212" y="6963885"/>
+            <a:ext cx="3854213" cy="431552"/>
+          </a:xfrm>
+          <a:prstGeom prst="rect">
+            <a:avLst/>
+          </a:prstGeom>
+          <a:ln w="12700">
+            <a:miter lim="400000"/>
+          </a:ln>
+          <a:extLst>
+            <a:ext uri="{C572A759-6A51-4108-AA02-DFA0A04FC94B}">
+              <ma14:wrappingTextBoxFlag xmlns:ma14="http://schemas.microsoft.com/office/mac/drawingml/2011/main" val="1"/>
+            </a:ext>
+          </a:extLst>
+        </p:spPr>
+        <p:txBody>
+          <a:bodyPr wrap="none" lIns="50800" tIns="50800" rIns="50800" bIns="50800" anchor="ctr">
+            <a:spAutoFit/>
+          </a:bodyPr>
+          <a:lstStyle>
+            <a:lvl1pPr>
+              <a:defRPr sz="2400"/>
+            </a:lvl1pPr>
+          </a:lstStyle>
+          <a:p>
+            <a:pPr/>
+            <a:r>
+              <a:t>DAA/Programming Overview</a:t>
+            </a:r>
+          </a:p>
+        </p:txBody>
+      </p:sp>
+      <p:sp>
+        <p:nvSpPr>
+          <p:cNvPr id="73" name="RPR/"/>
+          <p:cNvSpPr txBox="1"/>
+          <p:nvPr/>
+        </p:nvSpPr>
+        <p:spPr>
+          <a:xfrm>
+            <a:off x="7535212" y="6988206"/>
+            <a:ext cx="705605" cy="382910"/>
+          </a:xfrm>
+          <a:prstGeom prst="rect">
+            <a:avLst/>
+          </a:prstGeom>
+          <a:ln w="12700">
+            <a:miter lim="400000"/>
+          </a:ln>
+          <a:extLst>
+            <a:ext uri="{C572A759-6A51-4108-AA02-DFA0A04FC94B}">
+              <ma14:wrappingTextBoxFlag xmlns:ma14="http://schemas.microsoft.com/office/mac/drawingml/2011/main" val="1"/>
+            </a:ext>
+          </a:extLst>
+        </p:spPr>
+        <p:txBody>
+          <a:bodyPr wrap="none" lIns="50800" tIns="50800" rIns="50800" bIns="50800" anchor="ctr">
+            <a:spAutoFit/>
+          </a:bodyPr>
+          <a:lstStyle>
+            <a:lvl1pPr>
+              <a:defRPr sz="2000"/>
+            </a:lvl1pPr>
+          </a:lstStyle>
+          <a:p>
+            <a:pPr/>
+            <a:r>
+              <a:t>RPR/</a:t>
+            </a:r>
+          </a:p>
+        </p:txBody>
+      </p:sp>
+    </p:spTree>
+  </p:cSld>
+  <p:clrMapOvr>
+    <a:masterClrMapping/>
+  </p:clrMapOvr>
+  <p:transition xmlns:p14="http://schemas.microsoft.com/office/powerpoint/2010/main" spd="med" advClick="1"/>
+</p:sld>
+</file>
+
+<file path=ppt/slides/slide8.xml><?xml version="1.0" encoding="utf-8"?>
+<p:sld xmlns:a="http://schemas.openxmlformats.org/drawingml/2006/main" xmlns:r="http://schemas.openxmlformats.org/officeDocument/2006/relationships" xmlns:p="http://schemas.openxmlformats.org/presentationml/2006/main" xmlns:m="http://schemas.openxmlformats.org/officeDocument/2006/math" xmlns:a14="http://schemas.microsoft.com/office/drawing/2010/main" showMasterSp="1" showMasterPhAnim="1">
+  <p:cSld>
+    <p:spTree>
+      <p:nvGrpSpPr>
+        <p:cNvPr id="1" name=""/>
+        <p:cNvGrpSpPr/>
+        <p:nvPr/>
+      </p:nvGrpSpPr>
+      <p:grpSpPr>
+        <a:xfrm>
+          <a:off x="0" y="0"/>
+          <a:ext cx="0" cy="0"/>
+          <a:chOff x="0" y="0"/>
+          <a:chExt cx="0" cy="0"/>
+        </a:xfrm>
+      </p:grpSpPr>
+      <p:sp>
+        <p:nvSpPr>
+          <p:cNvPr id="75" name="Prog Exercise (Home)"/>
+          <p:cNvSpPr txBox="1"/>
+          <p:nvPr>
+            <p:ph type="title"/>
+          </p:nvPr>
+        </p:nvSpPr>
+        <p:spPr>
+          <a:prstGeom prst="rect">
+            <a:avLst/>
+          </a:prstGeom>
+        </p:spPr>
+        <p:txBody>
+          <a:bodyPr/>
+          <a:lstStyle/>
+          <a:p>
+            <a:pPr/>
+            <a:r>
+              <a:t>Prog Exercise (Home)</a:t>
+            </a:r>
+          </a:p>
+        </p:txBody>
+      </p:sp>
+      <p:sp>
+        <p:nvSpPr>
+          <p:cNvPr id="76" name="P1: Write the program that output your initials in the nine rows using the same letter…"/>
+          <p:cNvSpPr txBox="1"/>
+          <p:nvPr>
+            <p:ph type="body" idx="1"/>
+          </p:nvPr>
+        </p:nvSpPr>
+        <p:spPr>
+          <a:prstGeom prst="rect">
+            <a:avLst/>
+          </a:prstGeom>
+        </p:spPr>
+        <p:txBody>
+          <a:bodyPr/>
+          <a:lstStyle/>
+          <a:p>
+            <a:pPr/>
+            <a:r>
+              <a:rPr>
+                <a:latin typeface="Arial"/>
+                <a:ea typeface="Arial"/>
+                <a:cs typeface="Arial"/>
+                <a:sym typeface="Arial"/>
+              </a:rPr>
+              <a:t>P1</a:t>
+            </a:r>
+            <a:r>
+              <a:t>: Write the program that output your initials in the nine rows using the same letter</a:t>
+            </a:r>
+          </a:p>
+          <a:p>
+            <a:pPr/>
+            <a:r>
+              <a:t>P2: Write the program that takes initials as input (command line argument) and outputs them in the nine rows using the same letter e.g.</a:t>
+            </a:r>
+          </a:p>
+          <a:p>
+            <a:pPr lvl="1" marL="0" indent="228600">
+              <a:buSzTx/>
+              <a:buNone/>
+              <a:defRPr>
+                <a:latin typeface="Courier New"/>
+                <a:ea typeface="Courier New"/>
+                <a:cs typeface="Courier New"/>
+                <a:sym typeface="Courier New"/>
+              </a:defRPr>
+            </a:pPr>
+            <a:r>
+              <a:t>java Initials RPR</a:t>
+            </a:r>
+          </a:p>
+        </p:txBody>
+      </p:sp>
+      <p:sp>
+        <p:nvSpPr>
+          <p:cNvPr id="77" name="Slide Number"/>
+          <p:cNvSpPr txBox="1"/>
+          <p:nvPr>
+            <p:ph type="sldNum" sz="quarter" idx="2"/>
+          </p:nvPr>
+        </p:nvSpPr>
+        <p:spPr>
+          <a:prstGeom prst="rect">
+            <a:avLst/>
+          </a:prstGeom>
+          <a:extLst>
+            <a:ext uri="{C572A759-6A51-4108-AA02-DFA0A04FC94B}">
+              <ma14:wrappingTextBoxFlag xmlns:ma14="http://schemas.microsoft.com/office/mac/drawingml/2011/main" val="1"/>
+            </a:ext>
+          </a:extLst>
+        </p:spPr>
+        <p:txBody>
+          <a:bodyPr/>
+          <a:lstStyle/>
+          <a:p>
+            <a:pPr/>
+            <a:fld id="{86CB4B4D-7CA3-9044-876B-883B54F8677D}" type="slidenum"/>
+          </a:p>
+        </p:txBody>
+      </p:sp>
+      <p:sp>
+        <p:nvSpPr>
+          <p:cNvPr id="78" name="DAA/Programming Overview"/>
+          <p:cNvSpPr txBox="1"/>
+          <p:nvPr/>
+        </p:nvSpPr>
+        <p:spPr>
+          <a:xfrm>
+            <a:off x="423212" y="6963885"/>
+            <a:ext cx="3854213" cy="431552"/>
+          </a:xfrm>
+          <a:prstGeom prst="rect">
+            <a:avLst/>
+          </a:prstGeom>
+          <a:ln w="12700">
+            <a:miter lim="400000"/>
+          </a:ln>
+          <a:extLst>
+            <a:ext uri="{C572A759-6A51-4108-AA02-DFA0A04FC94B}">
+              <ma14:wrappingTextBoxFlag xmlns:ma14="http://schemas.microsoft.com/office/mac/drawingml/2011/main" val="1"/>
+            </a:ext>
+          </a:extLst>
+        </p:spPr>
+        <p:txBody>
+          <a:bodyPr wrap="none" lIns="50800" tIns="50800" rIns="50800" bIns="50800" anchor="ctr">
+            <a:spAutoFit/>
+          </a:bodyPr>
+          <a:lstStyle>
+            <a:lvl1pPr>
+              <a:defRPr sz="2400"/>
+            </a:lvl1pPr>
+          </a:lstStyle>
+          <a:p>
+            <a:pPr/>
+            <a:r>
+              <a:t>DAA/Programming Overview</a:t>
+            </a:r>
+          </a:p>
+        </p:txBody>
+      </p:sp>
+      <p:sp>
+        <p:nvSpPr>
+          <p:cNvPr id="79" name="RPR/"/>
+          <p:cNvSpPr txBox="1"/>
+          <p:nvPr/>
+        </p:nvSpPr>
+        <p:spPr>
+          <a:xfrm>
+            <a:off x="7535212" y="6988206"/>
+            <a:ext cx="705605" cy="382910"/>
+          </a:xfrm>
+          <a:prstGeom prst="rect">
+            <a:avLst/>
+          </a:prstGeom>
+          <a:ln w="12700">
+            <a:miter lim="400000"/>
+          </a:ln>
+          <a:extLst>
+            <a:ext uri="{C572A759-6A51-4108-AA02-DFA0A04FC94B}">
+              <ma14:wrappingTextBoxFlag xmlns:ma14="http://schemas.microsoft.com/office/mac/drawingml/2011/main" val="1"/>
+            </a:ext>
+          </a:extLst>
+        </p:spPr>
+        <p:txBody>
+          <a:bodyPr wrap="none" lIns="50800" tIns="50800" rIns="50800" bIns="50800" anchor="ctr">
+            <a:spAutoFit/>
+          </a:bodyPr>
+          <a:lstStyle>
+            <a:lvl1pPr>
+              <a:defRPr sz="2000"/>
+            </a:lvl1pPr>
+          </a:lstStyle>
+          <a:p>
+            <a:pPr/>
+            <a:r>
+              <a:t>RPR/</a:t>
+            </a:r>
+          </a:p>
+        </p:txBody>
+      </p:sp>
+    </p:spTree>
+  </p:cSld>
+  <p:clrMapOvr>
+    <a:masterClrMapping/>
+  </p:clrMapOvr>
+  <p:transition xmlns:p14="http://schemas.microsoft.com/office/powerpoint/2010/main" spd="med" advClick="1"/>
+  <p:timing>
+    <p:tnLst>
+      <p:par>
+        <p:cTn id="1" nodeType="tmRoot" restart="never" dur="indefinite" fill="hold">
+          <p:childTnLst>
+            <p:seq concurrent="1" prevAc="none" nextAc="seek">
+              <p:cTn id="2" nodeType="mainSeq" dur="indefinite" fill="hold">
+                <p:childTnLst>
+                  <p:par>
+                    <p:cTn id="3" fill="hold">
+                      <p:stCondLst>
+                        <p:cond delay="indefinite"/>
+                      </p:stCondLst>
+                      <p:childTnLst>
+                        <p:par>
+                          <p:cTn id="4" fill="hold">
+                            <p:stCondLst>
+                              <p:cond delay="0"/>
+                            </p:stCondLst>
+                            <p:childTnLst>
+                              <p:par>
+                                <p:cTn id="5" presetClass="entr" nodeType="clickEffect" presetSubtype="0" presetID="1" grpId="1" fill="hold">
+                                  <p:stCondLst>
+                                    <p:cond delay="0"/>
+                                  </p:stCondLst>
+                                  <p:iterate type="el" backwards="0">
+                                    <p:tmAbs val="0"/>
+                                  </p:iterate>
+                                  <p:childTnLst>
+                                    <p:set>
+                                      <p:cBhvr>
+                                        <p:cTn id="6" fill="hold"/>
+                                        <p:tgtEl>
+                                          <p:spTgt spid="76">
                                             <p:bg/>
                                           </p:spTgt>
                                         </p:tgtEl>
@@ -5386,7 +5783,7 @@
                                       <p:cBhvr>
                                         <p:cTn id="8" fill="hold"/>
                                         <p:tgtEl>
-                                          <p:spTgt spid="63">
+                                          <p:spTgt spid="76">
                                             <p:txEl>
                                               <p:pRg st="0" end="0"/>
                                             </p:txEl>
@@ -5434,7 +5831,7 @@
                                       <p:cBhvr>
                                         <p:cTn id="12" fill="hold"/>
                                         <p:tgtEl>
-                                          <p:spTgt spid="63">
+                                          <p:spTgt spid="76">
                                             <p:txEl>
                                               <p:pRg st="1" end="1"/>
                                             </p:txEl>
@@ -5482,489 +5879,9 @@
                                       <p:cBhvr>
                                         <p:cTn id="16" fill="hold"/>
                                         <p:tgtEl>
-                                          <p:spTgt spid="63">
+                                          <p:spTgt spid="76">
                                             <p:txEl>
                                               <p:pRg st="2" end="2"/>
-                                            </p:txEl>
-                                          </p:spTgt>
-                                        </p:tgtEl>
-                                        <p:attrNameLst>
-                                          <p:attrName>style.visibility</p:attrName>
-                                        </p:attrNameLst>
-                                      </p:cBhvr>
-                                      <p:to>
-                                        <p:strVal val="visible"/>
-                                      </p:to>
-                                    </p:set>
-                                  </p:childTnLst>
-                                </p:cTn>
-                              </p:par>
-                            </p:childTnLst>
-                          </p:cTn>
-                        </p:par>
-                      </p:childTnLst>
-                    </p:cTn>
-                  </p:par>
-                  <p:par>
-                    <p:cTn id="17" fill="hold">
-                      <p:stCondLst>
-                        <p:cond delay="indefinite"/>
-                      </p:stCondLst>
-                      <p:childTnLst>
-                        <p:par>
-                          <p:cTn id="18" fill="hold">
-                            <p:stCondLst>
-                              <p:cond delay="0"/>
-                            </p:stCondLst>
-                            <p:childTnLst>
-                              <p:par>
-                                <p:cTn id="19" presetClass="entr" nodeType="clickEffect" presetSubtype="0" presetID="1" grpId="1" fill="hold">
-                                  <p:stCondLst>
-                                    <p:cond delay="0"/>
-                                  </p:stCondLst>
-                                  <p:iterate type="el" backwards="0">
-                                    <p:tmAbs val="0"/>
-                                  </p:iterate>
-                                  <p:childTnLst>
-                                    <p:set>
-                                      <p:cBhvr>
-                                        <p:cTn id="20" fill="hold"/>
-                                        <p:tgtEl>
-                                          <p:spTgt spid="63">
-                                            <p:txEl>
-                                              <p:pRg st="3" end="3"/>
-                                            </p:txEl>
-                                          </p:spTgt>
-                                        </p:tgtEl>
-                                        <p:attrNameLst>
-                                          <p:attrName>style.visibility</p:attrName>
-                                        </p:attrNameLst>
-                                      </p:cBhvr>
-                                      <p:to>
-                                        <p:strVal val="visible"/>
-                                      </p:to>
-                                    </p:set>
-                                  </p:childTnLst>
-                                </p:cTn>
-                              </p:par>
-                            </p:childTnLst>
-                          </p:cTn>
-                        </p:par>
-                      </p:childTnLst>
-                    </p:cTn>
-                  </p:par>
-                  <p:par>
-                    <p:cTn id="21" fill="hold">
-                      <p:stCondLst>
-                        <p:cond delay="indefinite"/>
-                      </p:stCondLst>
-                      <p:childTnLst>
-                        <p:par>
-                          <p:cTn id="22" fill="hold">
-                            <p:stCondLst>
-                              <p:cond delay="0"/>
-                            </p:stCondLst>
-                            <p:childTnLst>
-                              <p:par>
-                                <p:cTn id="23" presetClass="entr" nodeType="clickEffect" presetSubtype="0" presetID="1" grpId="1" fill="hold">
-                                  <p:stCondLst>
-                                    <p:cond delay="0"/>
-                                  </p:stCondLst>
-                                  <p:iterate type="el" backwards="0">
-                                    <p:tmAbs val="0"/>
-                                  </p:iterate>
-                                  <p:childTnLst>
-                                    <p:set>
-                                      <p:cBhvr>
-                                        <p:cTn id="24" fill="hold"/>
-                                        <p:tgtEl>
-                                          <p:spTgt spid="63">
-                                            <p:txEl>
-                                              <p:pRg st="4" end="4"/>
-                                            </p:txEl>
-                                          </p:spTgt>
-                                        </p:tgtEl>
-                                        <p:attrNameLst>
-                                          <p:attrName>style.visibility</p:attrName>
-                                        </p:attrNameLst>
-                                      </p:cBhvr>
-                                      <p:to>
-                                        <p:strVal val="visible"/>
-                                      </p:to>
-                                    </p:set>
-                                  </p:childTnLst>
-                                </p:cTn>
-                              </p:par>
-                            </p:childTnLst>
-                          </p:cTn>
-                        </p:par>
-                      </p:childTnLst>
-                    </p:cTn>
-                  </p:par>
-                  <p:par>
-                    <p:cTn id="25" fill="hold">
-                      <p:stCondLst>
-                        <p:cond delay="indefinite"/>
-                      </p:stCondLst>
-                      <p:childTnLst>
-                        <p:par>
-                          <p:cTn id="26" fill="hold">
-                            <p:stCondLst>
-                              <p:cond delay="0"/>
-                            </p:stCondLst>
-                            <p:childTnLst>
-                              <p:par>
-                                <p:cTn id="27" presetClass="entr" nodeType="clickEffect" presetSubtype="0" presetID="1" grpId="1" fill="hold">
-                                  <p:stCondLst>
-                                    <p:cond delay="0"/>
-                                  </p:stCondLst>
-                                  <p:iterate type="el" backwards="0">
-                                    <p:tmAbs val="0"/>
-                                  </p:iterate>
-                                  <p:childTnLst>
-                                    <p:set>
-                                      <p:cBhvr>
-                                        <p:cTn id="28" fill="hold"/>
-                                        <p:tgtEl>
-                                          <p:spTgt spid="63">
-                                            <p:txEl>
-                                              <p:pRg st="5" end="5"/>
-                                            </p:txEl>
-                                          </p:spTgt>
-                                        </p:tgtEl>
-                                        <p:attrNameLst>
-                                          <p:attrName>style.visibility</p:attrName>
-                                        </p:attrNameLst>
-                                      </p:cBhvr>
-                                      <p:to>
-                                        <p:strVal val="visible"/>
-                                      </p:to>
-                                    </p:set>
-                                  </p:childTnLst>
-                                </p:cTn>
-                              </p:par>
-                            </p:childTnLst>
-                          </p:cTn>
-                        </p:par>
-                      </p:childTnLst>
-                    </p:cTn>
-                  </p:par>
-                  <p:par>
-                    <p:cTn id="29" fill="hold">
-                      <p:stCondLst>
-                        <p:cond delay="indefinite"/>
-                      </p:stCondLst>
-                      <p:childTnLst>
-                        <p:par>
-                          <p:cTn id="30" fill="hold">
-                            <p:stCondLst>
-                              <p:cond delay="0"/>
-                            </p:stCondLst>
-                            <p:childTnLst>
-                              <p:par>
-                                <p:cTn id="31" presetClass="entr" nodeType="clickEffect" presetSubtype="0" presetID="1" grpId="1" fill="hold">
-                                  <p:stCondLst>
-                                    <p:cond delay="0"/>
-                                  </p:stCondLst>
-                                  <p:iterate type="el" backwards="0">
-                                    <p:tmAbs val="0"/>
-                                  </p:iterate>
-                                  <p:childTnLst>
-                                    <p:set>
-                                      <p:cBhvr>
-                                        <p:cTn id="32" fill="hold"/>
-                                        <p:tgtEl>
-                                          <p:spTgt spid="63">
-                                            <p:txEl>
-                                              <p:pRg st="6" end="6"/>
-                                            </p:txEl>
-                                          </p:spTgt>
-                                        </p:tgtEl>
-                                        <p:attrNameLst>
-                                          <p:attrName>style.visibility</p:attrName>
-                                        </p:attrNameLst>
-                                      </p:cBhvr>
-                                      <p:to>
-                                        <p:strVal val="visible"/>
-                                      </p:to>
-                                    </p:set>
-                                  </p:childTnLst>
-                                </p:cTn>
-                              </p:par>
-                            </p:childTnLst>
-                          </p:cTn>
-                        </p:par>
-                      </p:childTnLst>
-                    </p:cTn>
-                  </p:par>
-                  <p:par>
-                    <p:cTn id="33" fill="hold">
-                      <p:stCondLst>
-                        <p:cond delay="indefinite"/>
-                      </p:stCondLst>
-                      <p:childTnLst>
-                        <p:par>
-                          <p:cTn id="34" fill="hold">
-                            <p:stCondLst>
-                              <p:cond delay="0"/>
-                            </p:stCondLst>
-                            <p:childTnLst>
-                              <p:par>
-                                <p:cTn id="35" presetClass="entr" nodeType="clickEffect" presetSubtype="0" presetID="1" grpId="1" fill="hold">
-                                  <p:stCondLst>
-                                    <p:cond delay="0"/>
-                                  </p:stCondLst>
-                                  <p:iterate type="el" backwards="0">
-                                    <p:tmAbs val="0"/>
-                                  </p:iterate>
-                                  <p:childTnLst>
-                                    <p:set>
-                                      <p:cBhvr>
-                                        <p:cTn id="36" fill="hold"/>
-                                        <p:tgtEl>
-                                          <p:spTgt spid="63">
-                                            <p:txEl>
-                                              <p:pRg st="7" end="7"/>
-                                            </p:txEl>
-                                          </p:spTgt>
-                                        </p:tgtEl>
-                                        <p:attrNameLst>
-                                          <p:attrName>style.visibility</p:attrName>
-                                        </p:attrNameLst>
-                                      </p:cBhvr>
-                                      <p:to>
-                                        <p:strVal val="visible"/>
-                                      </p:to>
-                                    </p:set>
-                                  </p:childTnLst>
-                                </p:cTn>
-                              </p:par>
-                            </p:childTnLst>
-                          </p:cTn>
-                        </p:par>
-                      </p:childTnLst>
-                    </p:cTn>
-                  </p:par>
-                  <p:par>
-                    <p:cTn id="37" fill="hold">
-                      <p:stCondLst>
-                        <p:cond delay="indefinite"/>
-                      </p:stCondLst>
-                      <p:childTnLst>
-                        <p:par>
-                          <p:cTn id="38" fill="hold">
-                            <p:stCondLst>
-                              <p:cond delay="0"/>
-                            </p:stCondLst>
-                            <p:childTnLst>
-                              <p:par>
-                                <p:cTn id="39" presetClass="entr" nodeType="clickEffect" presetSubtype="0" presetID="1" grpId="1" fill="hold">
-                                  <p:stCondLst>
-                                    <p:cond delay="0"/>
-                                  </p:stCondLst>
-                                  <p:iterate type="el" backwards="0">
-                                    <p:tmAbs val="0"/>
-                                  </p:iterate>
-                                  <p:childTnLst>
-                                    <p:set>
-                                      <p:cBhvr>
-                                        <p:cTn id="40" fill="hold"/>
-                                        <p:tgtEl>
-                                          <p:spTgt spid="63">
-                                            <p:txEl>
-                                              <p:pRg st="8" end="8"/>
-                                            </p:txEl>
-                                          </p:spTgt>
-                                        </p:tgtEl>
-                                        <p:attrNameLst>
-                                          <p:attrName>style.visibility</p:attrName>
-                                        </p:attrNameLst>
-                                      </p:cBhvr>
-                                      <p:to>
-                                        <p:strVal val="visible"/>
-                                      </p:to>
-                                    </p:set>
-                                  </p:childTnLst>
-                                </p:cTn>
-                              </p:par>
-                            </p:childTnLst>
-                          </p:cTn>
-                        </p:par>
-                      </p:childTnLst>
-                    </p:cTn>
-                  </p:par>
-                  <p:par>
-                    <p:cTn id="41" fill="hold">
-                      <p:stCondLst>
-                        <p:cond delay="indefinite"/>
-                      </p:stCondLst>
-                      <p:childTnLst>
-                        <p:par>
-                          <p:cTn id="42" fill="hold">
-                            <p:stCondLst>
-                              <p:cond delay="0"/>
-                            </p:stCondLst>
-                            <p:childTnLst>
-                              <p:par>
-                                <p:cTn id="43" presetClass="entr" nodeType="clickEffect" presetSubtype="0" presetID="1" grpId="1" fill="hold">
-                                  <p:stCondLst>
-                                    <p:cond delay="0"/>
-                                  </p:stCondLst>
-                                  <p:iterate type="el" backwards="0">
-                                    <p:tmAbs val="0"/>
-                                  </p:iterate>
-                                  <p:childTnLst>
-                                    <p:set>
-                                      <p:cBhvr>
-                                        <p:cTn id="44" fill="hold"/>
-                                        <p:tgtEl>
-                                          <p:spTgt spid="63">
-                                            <p:txEl>
-                                              <p:pRg st="9" end="9"/>
-                                            </p:txEl>
-                                          </p:spTgt>
-                                        </p:tgtEl>
-                                        <p:attrNameLst>
-                                          <p:attrName>style.visibility</p:attrName>
-                                        </p:attrNameLst>
-                                      </p:cBhvr>
-                                      <p:to>
-                                        <p:strVal val="visible"/>
-                                      </p:to>
-                                    </p:set>
-                                  </p:childTnLst>
-                                </p:cTn>
-                              </p:par>
-                            </p:childTnLst>
-                          </p:cTn>
-                        </p:par>
-                      </p:childTnLst>
-                    </p:cTn>
-                  </p:par>
-                  <p:par>
-                    <p:cTn id="45" fill="hold">
-                      <p:stCondLst>
-                        <p:cond delay="indefinite"/>
-                      </p:stCondLst>
-                      <p:childTnLst>
-                        <p:par>
-                          <p:cTn id="46" fill="hold">
-                            <p:stCondLst>
-                              <p:cond delay="0"/>
-                            </p:stCondLst>
-                            <p:childTnLst>
-                              <p:par>
-                                <p:cTn id="47" presetClass="entr" nodeType="clickEffect" presetSubtype="0" presetID="1" grpId="1" fill="hold">
-                                  <p:stCondLst>
-                                    <p:cond delay="0"/>
-                                  </p:stCondLst>
-                                  <p:iterate type="el" backwards="0">
-                                    <p:tmAbs val="0"/>
-                                  </p:iterate>
-                                  <p:childTnLst>
-                                    <p:set>
-                                      <p:cBhvr>
-                                        <p:cTn id="48" fill="hold"/>
-                                        <p:tgtEl>
-                                          <p:spTgt spid="63">
-                                            <p:txEl>
-                                              <p:pRg st="10" end="10"/>
-                                            </p:txEl>
-                                          </p:spTgt>
-                                        </p:tgtEl>
-                                        <p:attrNameLst>
-                                          <p:attrName>style.visibility</p:attrName>
-                                        </p:attrNameLst>
-                                      </p:cBhvr>
-                                      <p:to>
-                                        <p:strVal val="visible"/>
-                                      </p:to>
-                                    </p:set>
-                                  </p:childTnLst>
-                                </p:cTn>
-                              </p:par>
-                            </p:childTnLst>
-                          </p:cTn>
-                        </p:par>
-                      </p:childTnLst>
-                    </p:cTn>
-                  </p:par>
-                  <p:par>
-                    <p:cTn id="49" fill="hold">
-                      <p:stCondLst>
-                        <p:cond delay="indefinite"/>
-                      </p:stCondLst>
-                      <p:childTnLst>
-                        <p:par>
-                          <p:cTn id="50" fill="hold">
-                            <p:stCondLst>
-                              <p:cond delay="0"/>
-                            </p:stCondLst>
-                            <p:childTnLst>
-                              <p:par>
-                                <p:cTn id="51" presetClass="entr" nodeType="clickEffect" presetSubtype="0" presetID="1" grpId="1" fill="hold">
-                                  <p:stCondLst>
-                                    <p:cond delay="0"/>
-                                  </p:stCondLst>
-                                  <p:iterate type="el" backwards="0">
-                                    <p:tmAbs val="0"/>
-                                  </p:iterate>
-                                  <p:childTnLst>
-                                    <p:set>
-                                      <p:cBhvr>
-                                        <p:cTn id="52" fill="hold"/>
-                                        <p:tgtEl>
-                                          <p:spTgt spid="63">
-                                            <p:txEl>
-                                              <p:pRg st="11" end="11"/>
-                                            </p:txEl>
-                                          </p:spTgt>
-                                        </p:tgtEl>
-                                        <p:attrNameLst>
-                                          <p:attrName>style.visibility</p:attrName>
-                                        </p:attrNameLst>
-                                      </p:cBhvr>
-                                      <p:to>
-                                        <p:strVal val="visible"/>
-                                      </p:to>
-                                    </p:set>
-                                  </p:childTnLst>
-                                </p:cTn>
-                              </p:par>
-                            </p:childTnLst>
-                          </p:cTn>
-                        </p:par>
-                      </p:childTnLst>
-                    </p:cTn>
-                  </p:par>
-                  <p:par>
-                    <p:cTn id="53" fill="hold">
-                      <p:stCondLst>
-                        <p:cond delay="indefinite"/>
-                      </p:stCondLst>
-                      <p:childTnLst>
-                        <p:par>
-                          <p:cTn id="54" fill="hold">
-                            <p:stCondLst>
-                              <p:cond delay="0"/>
-                            </p:stCondLst>
-                            <p:childTnLst>
-                              <p:par>
-                                <p:cTn id="55" presetClass="entr" nodeType="clickEffect" presetSubtype="0" presetID="1" grpId="1" fill="hold">
-                                  <p:stCondLst>
-                                    <p:cond delay="0"/>
-                                  </p:stCondLst>
-                                  <p:iterate type="el" backwards="0">
-                                    <p:tmAbs val="0"/>
-                                  </p:iterate>
-                                  <p:childTnLst>
-                                    <p:set>
-                                      <p:cBhvr>
-                                        <p:cTn id="56" fill="hold"/>
-                                        <p:tgtEl>
-                                          <p:spTgt spid="63">
-                                            <p:txEl>
-                                              <p:pRg st="12" end="12"/>
                                             </p:txEl>
                                           </p:spTgt>
                                         </p:tgtEl>
@@ -6007,13 +5924,13 @@
       </p:par>
     </p:tnLst>
     <p:bldLst>
-      <p:bldP build="p" bldLvl="5" animBg="1" rev="0" advAuto="0" spid="63" grpId="1"/>
+      <p:bldP build="p" bldLvl="5" animBg="1" rev="0" advAuto="0" spid="76" grpId="1"/>
     </p:bldLst>
   </p:timing>
 </p:sld>
 </file>
 
-<file path=ppt/slides/slide7.xml><?xml version="1.0" encoding="utf-8"?>
+<file path=ppt/slides/slide9.xml><?xml version="1.0" encoding="utf-8"?>
 <p:sld xmlns:a="http://schemas.openxmlformats.org/drawingml/2006/main" xmlns:r="http://schemas.openxmlformats.org/officeDocument/2006/relationships" xmlns:p="http://schemas.openxmlformats.org/presentationml/2006/main" xmlns:m="http://schemas.openxmlformats.org/officeDocument/2006/math" xmlns:a14="http://schemas.microsoft.com/office/drawing/2010/main" showMasterSp="1" showMasterPhAnim="1">
   <p:cSld>
     <p:spTree>
@@ -6032,7 +5949,7 @@
       </p:grpSpPr>
       <p:sp>
         <p:nvSpPr>
-          <p:cNvPr id="68" name="Prog Exercise (Home)"/>
+          <p:cNvPr id="81" name="Basic Java Quiz"/>
           <p:cNvSpPr txBox="1"/>
           <p:nvPr>
             <p:ph type="title"/>
@@ -6049,14 +5966,14 @@
           <a:p>
             <a:pPr/>
             <a:r>
-              <a:t>Prog Exercise (Home)</a:t>
+              <a:t>Basic Java Quiz</a:t>
             </a:r>
           </a:p>
         </p:txBody>
       </p:sp>
       <p:sp>
         <p:nvSpPr>
-          <p:cNvPr id="69" name="Write the program that takes initials as input and outputs them in the nine rows using the same letter."/>
+          <p:cNvPr id="82" name="Answer the set of 25 questions on basics of java.…"/>
           <p:cNvSpPr txBox="1"/>
           <p:nvPr>
             <p:ph type="body" idx="1"/>
@@ -6073,14 +5990,26 @@
           <a:p>
             <a:pPr/>
             <a:r>
-              <a:t>Write the program that takes initials as input and outputs them in the nine rows using the same letter.</a:t>
+              <a:t>Answer the set of 25 questions on basics of java.</a:t>
+            </a:r>
+          </a:p>
+          <a:p>
+            <a:pPr lvl="1"/>
+            <a:r>
+              <a:t>Quiz-01.pdf</a:t>
+            </a:r>
+          </a:p>
+          <a:p>
+            <a:pPr/>
+            <a:r>
+              <a:t>Answers to Quiz-01.</a:t>
             </a:r>
           </a:p>
         </p:txBody>
       </p:sp>
       <p:sp>
         <p:nvSpPr>
-          <p:cNvPr id="70" name="Slide Number"/>
+          <p:cNvPr id="83" name="Slide Number"/>
           <p:cNvSpPr txBox="1"/>
           <p:nvPr>
             <p:ph type="sldNum" sz="quarter" idx="2"/>
@@ -6107,7 +6036,7 @@
       </p:sp>
       <p:sp>
         <p:nvSpPr>
-          <p:cNvPr id="71" name="DAA/Programming Overview"/>
+          <p:cNvPr id="84" name="DAA/Programming Overview"/>
           <p:cNvSpPr txBox="1"/>
           <p:nvPr/>
         </p:nvSpPr>
@@ -6147,200 +6076,7 @@
       </p:sp>
       <p:sp>
         <p:nvSpPr>
-          <p:cNvPr id="72" name="RPR/"/>
-          <p:cNvSpPr txBox="1"/>
-          <p:nvPr/>
-        </p:nvSpPr>
-        <p:spPr>
-          <a:xfrm>
-            <a:off x="7535212" y="6988206"/>
-            <a:ext cx="705605" cy="382910"/>
-          </a:xfrm>
-          <a:prstGeom prst="rect">
-            <a:avLst/>
-          </a:prstGeom>
-          <a:ln w="12700">
-            <a:miter lim="400000"/>
-          </a:ln>
-          <a:extLst>
-            <a:ext uri="{C572A759-6A51-4108-AA02-DFA0A04FC94B}">
-              <ma14:wrappingTextBoxFlag xmlns:ma14="http://schemas.microsoft.com/office/mac/drawingml/2011/main" val="1"/>
-            </a:ext>
-          </a:extLst>
-        </p:spPr>
-        <p:txBody>
-          <a:bodyPr wrap="none" lIns="50800" tIns="50800" rIns="50800" bIns="50800" anchor="ctr">
-            <a:spAutoFit/>
-          </a:bodyPr>
-          <a:lstStyle>
-            <a:lvl1pPr>
-              <a:defRPr sz="2000"/>
-            </a:lvl1pPr>
-          </a:lstStyle>
-          <a:p>
-            <a:pPr/>
-            <a:r>
-              <a:t>RPR/</a:t>
-            </a:r>
-          </a:p>
-        </p:txBody>
-      </p:sp>
-    </p:spTree>
-  </p:cSld>
-  <p:clrMapOvr>
-    <a:masterClrMapping/>
-  </p:clrMapOvr>
-  <p:transition xmlns:p14="http://schemas.microsoft.com/office/powerpoint/2010/main" spd="med" advClick="1"/>
-</p:sld>
-</file>
-
-<file path=ppt/slides/slide8.xml><?xml version="1.0" encoding="utf-8"?>
-<p:sld xmlns:a="http://schemas.openxmlformats.org/drawingml/2006/main" xmlns:r="http://schemas.openxmlformats.org/officeDocument/2006/relationships" xmlns:p="http://schemas.openxmlformats.org/presentationml/2006/main" xmlns:m="http://schemas.openxmlformats.org/officeDocument/2006/math" xmlns:a14="http://schemas.microsoft.com/office/drawing/2010/main" showMasterSp="1" showMasterPhAnim="1">
-  <p:cSld>
-    <p:spTree>
-      <p:nvGrpSpPr>
-        <p:cNvPr id="1" name=""/>
-        <p:cNvGrpSpPr/>
-        <p:nvPr/>
-      </p:nvGrpSpPr>
-      <p:grpSpPr>
-        <a:xfrm>
-          <a:off x="0" y="0"/>
-          <a:ext cx="0" cy="0"/>
-          <a:chOff x="0" y="0"/>
-          <a:chExt cx="0" cy="0"/>
-        </a:xfrm>
-      </p:grpSpPr>
-      <p:sp>
-        <p:nvSpPr>
-          <p:cNvPr id="74" name="Basic Java Quiz"/>
-          <p:cNvSpPr txBox="1"/>
-          <p:nvPr>
-            <p:ph type="title"/>
-          </p:nvPr>
-        </p:nvSpPr>
-        <p:spPr>
-          <a:prstGeom prst="rect">
-            <a:avLst/>
-          </a:prstGeom>
-        </p:spPr>
-        <p:txBody>
-          <a:bodyPr/>
-          <a:lstStyle/>
-          <a:p>
-            <a:pPr/>
-            <a:r>
-              <a:t>Basic Java Quiz</a:t>
-            </a:r>
-          </a:p>
-        </p:txBody>
-      </p:sp>
-      <p:sp>
-        <p:nvSpPr>
-          <p:cNvPr id="75" name="Answer the set of 25 questions on basics of java.…"/>
-          <p:cNvSpPr txBox="1"/>
-          <p:nvPr>
-            <p:ph type="body" idx="1"/>
-          </p:nvPr>
-        </p:nvSpPr>
-        <p:spPr>
-          <a:prstGeom prst="rect">
-            <a:avLst/>
-          </a:prstGeom>
-        </p:spPr>
-        <p:txBody>
-          <a:bodyPr/>
-          <a:lstStyle/>
-          <a:p>
-            <a:pPr/>
-            <a:r>
-              <a:t>Answer the set of 25 questions on basics of java.</a:t>
-            </a:r>
-          </a:p>
-          <a:p>
-            <a:pPr lvl="1"/>
-            <a:r>
-              <a:t>Quiz-01.pdf</a:t>
-            </a:r>
-          </a:p>
-          <a:p>
-            <a:pPr/>
-            <a:r>
-              <a:t>Answers to Quiz-01.</a:t>
-            </a:r>
-          </a:p>
-        </p:txBody>
-      </p:sp>
-      <p:sp>
-        <p:nvSpPr>
-          <p:cNvPr id="76" name="Slide Number"/>
-          <p:cNvSpPr txBox="1"/>
-          <p:nvPr>
-            <p:ph type="sldNum" sz="quarter" idx="2"/>
-          </p:nvPr>
-        </p:nvSpPr>
-        <p:spPr>
-          <a:prstGeom prst="rect">
-            <a:avLst/>
-          </a:prstGeom>
-          <a:extLst>
-            <a:ext uri="{C572A759-6A51-4108-AA02-DFA0A04FC94B}">
-              <ma14:wrappingTextBoxFlag xmlns:ma14="http://schemas.microsoft.com/office/mac/drawingml/2011/main" val="1"/>
-            </a:ext>
-          </a:extLst>
-        </p:spPr>
-        <p:txBody>
-          <a:bodyPr/>
-          <a:lstStyle/>
-          <a:p>
-            <a:pPr/>
-            <a:fld id="{86CB4B4D-7CA3-9044-876B-883B54F8677D}" type="slidenum"/>
-          </a:p>
-        </p:txBody>
-      </p:sp>
-      <p:sp>
-        <p:nvSpPr>
-          <p:cNvPr id="77" name="DAA/Programming Overview"/>
-          <p:cNvSpPr txBox="1"/>
-          <p:nvPr/>
-        </p:nvSpPr>
-        <p:spPr>
-          <a:xfrm>
-            <a:off x="423212" y="6963885"/>
-            <a:ext cx="3854213" cy="431552"/>
-          </a:xfrm>
-          <a:prstGeom prst="rect">
-            <a:avLst/>
-          </a:prstGeom>
-          <a:ln w="12700">
-            <a:miter lim="400000"/>
-          </a:ln>
-          <a:extLst>
-            <a:ext uri="{C572A759-6A51-4108-AA02-DFA0A04FC94B}">
-              <ma14:wrappingTextBoxFlag xmlns:ma14="http://schemas.microsoft.com/office/mac/drawingml/2011/main" val="1"/>
-            </a:ext>
-          </a:extLst>
-        </p:spPr>
-        <p:txBody>
-          <a:bodyPr wrap="none" lIns="50800" tIns="50800" rIns="50800" bIns="50800" anchor="ctr">
-            <a:spAutoFit/>
-          </a:bodyPr>
-          <a:lstStyle>
-            <a:lvl1pPr>
-              <a:defRPr sz="2400"/>
-            </a:lvl1pPr>
-          </a:lstStyle>
-          <a:p>
-            <a:pPr/>
-            <a:r>
-              <a:t>DAA/Programming Overview</a:t>
-            </a:r>
-          </a:p>
-        </p:txBody>
-      </p:sp>
-      <p:sp>
-        <p:nvSpPr>
-          <p:cNvPr id="78" name="RPR/"/>
+          <p:cNvPr id="85" name="RPR/"/>
           <p:cNvSpPr txBox="1"/>
           <p:nvPr/>
         </p:nvSpPr>

</xml_diff>